<commit_message>
Updating File_Transfer.pdf and File_Transfer.pptx
Updates made:
 - updated the date
 - added UST slide
 - fixed 2 links for RTD
</commit_message>
<xml_diff>
--- a/transferring_data/File_transfer.pptx
+++ b/transferring_data/File_transfer.pptx
@@ -5,29 +5,30 @@
     <p:sldMasterId id="2147483660" r:id="rId4"/>
   </p:sldMasterIdLst>
   <p:notesMasterIdLst>
-    <p:notesMasterId r:id="rId25"/>
+    <p:notesMasterId r:id="rId26"/>
   </p:notesMasterIdLst>
   <p:sldIdLst>
     <p:sldId id="340" r:id="rId5"/>
-    <p:sldId id="351" r:id="rId6"/>
-    <p:sldId id="393" r:id="rId7"/>
-    <p:sldId id="359" r:id="rId8"/>
-    <p:sldId id="371" r:id="rId9"/>
-    <p:sldId id="367" r:id="rId10"/>
-    <p:sldId id="368" r:id="rId11"/>
-    <p:sldId id="264" r:id="rId12"/>
-    <p:sldId id="266" r:id="rId13"/>
-    <p:sldId id="384" r:id="rId14"/>
-    <p:sldId id="386" r:id="rId15"/>
-    <p:sldId id="385" r:id="rId16"/>
-    <p:sldId id="388" r:id="rId17"/>
-    <p:sldId id="387" r:id="rId18"/>
-    <p:sldId id="389" r:id="rId19"/>
-    <p:sldId id="390" r:id="rId20"/>
-    <p:sldId id="391" r:id="rId21"/>
-    <p:sldId id="274" r:id="rId22"/>
-    <p:sldId id="392" r:id="rId23"/>
-    <p:sldId id="337" r:id="rId24"/>
+    <p:sldId id="394" r:id="rId6"/>
+    <p:sldId id="351" r:id="rId7"/>
+    <p:sldId id="393" r:id="rId8"/>
+    <p:sldId id="359" r:id="rId9"/>
+    <p:sldId id="371" r:id="rId10"/>
+    <p:sldId id="367" r:id="rId11"/>
+    <p:sldId id="368" r:id="rId12"/>
+    <p:sldId id="264" r:id="rId13"/>
+    <p:sldId id="266" r:id="rId14"/>
+    <p:sldId id="384" r:id="rId15"/>
+    <p:sldId id="386" r:id="rId16"/>
+    <p:sldId id="385" r:id="rId17"/>
+    <p:sldId id="388" r:id="rId18"/>
+    <p:sldId id="387" r:id="rId19"/>
+    <p:sldId id="389" r:id="rId20"/>
+    <p:sldId id="390" r:id="rId21"/>
+    <p:sldId id="391" r:id="rId22"/>
+    <p:sldId id="274" r:id="rId23"/>
+    <p:sldId id="392" r:id="rId24"/>
+    <p:sldId id="337" r:id="rId25"/>
   </p:sldIdLst>
   <p:sldSz cx="12192000" cy="6858000"/>
   <p:notesSz cx="6858000" cy="9144000"/>
@@ -216,7 +217,7 @@
           <a:p>
             <a:fld id="{EFDA08D6-E137-3341-A5EE-84219A24203E}" type="datetimeFigureOut">
               <a:rPr lang="en-US" smtClean="0"/>
-              <a:t>8/13/24</a:t>
+              <a:t>1/3/2025</a:t>
             </a:fld>
             <a:endParaRPr lang="en-US"/>
           </a:p>
@@ -527,7 +528,7 @@
           <a:bodyPr/>
           <a:lstStyle/>
           <a:p>
-            <a:endParaRPr lang="en-US"/>
+            <a:endParaRPr lang="en-US" dirty="0"/>
           </a:p>
         </p:txBody>
       </p:sp>
@@ -641,7 +642,7 @@
     </p:spTree>
     <p:extLst>
       <p:ext uri="{BB962C8B-B14F-4D97-AF65-F5344CB8AC3E}">
-        <p14:creationId xmlns:p14="http://schemas.microsoft.com/office/powerpoint/2010/main" val="1062461199"/>
+        <p14:creationId xmlns:p14="http://schemas.microsoft.com/office/powerpoint/2010/main" val="3724837669"/>
       </p:ext>
     </p:extLst>
   </p:cSld>
@@ -725,7 +726,7 @@
     </p:spTree>
     <p:extLst>
       <p:ext uri="{BB962C8B-B14F-4D97-AF65-F5344CB8AC3E}">
-        <p14:creationId xmlns:p14="http://schemas.microsoft.com/office/powerpoint/2010/main" val="4216946628"/>
+        <p14:creationId xmlns:p14="http://schemas.microsoft.com/office/powerpoint/2010/main" val="1062461199"/>
       </p:ext>
     </p:extLst>
   </p:cSld>
@@ -809,7 +810,7 @@
     </p:spTree>
     <p:extLst>
       <p:ext uri="{BB962C8B-B14F-4D97-AF65-F5344CB8AC3E}">
-        <p14:creationId xmlns:p14="http://schemas.microsoft.com/office/powerpoint/2010/main" val="3651044744"/>
+        <p14:creationId xmlns:p14="http://schemas.microsoft.com/office/powerpoint/2010/main" val="4216946628"/>
       </p:ext>
     </p:extLst>
   </p:cSld>
@@ -893,7 +894,7 @@
     </p:spTree>
     <p:extLst>
       <p:ext uri="{BB962C8B-B14F-4D97-AF65-F5344CB8AC3E}">
-        <p14:creationId xmlns:p14="http://schemas.microsoft.com/office/powerpoint/2010/main" val="2759283976"/>
+        <p14:creationId xmlns:p14="http://schemas.microsoft.com/office/powerpoint/2010/main" val="3651044744"/>
       </p:ext>
     </p:extLst>
   </p:cSld>
@@ -977,7 +978,7 @@
     </p:spTree>
     <p:extLst>
       <p:ext uri="{BB962C8B-B14F-4D97-AF65-F5344CB8AC3E}">
-        <p14:creationId xmlns:p14="http://schemas.microsoft.com/office/powerpoint/2010/main" val="1787176823"/>
+        <p14:creationId xmlns:p14="http://schemas.microsoft.com/office/powerpoint/2010/main" val="2759283976"/>
       </p:ext>
     </p:extLst>
   </p:cSld>
@@ -1061,7 +1062,7 @@
     </p:spTree>
     <p:extLst>
       <p:ext uri="{BB962C8B-B14F-4D97-AF65-F5344CB8AC3E}">
-        <p14:creationId xmlns:p14="http://schemas.microsoft.com/office/powerpoint/2010/main" val="2544437093"/>
+        <p14:creationId xmlns:p14="http://schemas.microsoft.com/office/powerpoint/2010/main" val="1787176823"/>
       </p:ext>
     </p:extLst>
   </p:cSld>
@@ -1145,7 +1146,7 @@
     </p:spTree>
     <p:extLst>
       <p:ext uri="{BB962C8B-B14F-4D97-AF65-F5344CB8AC3E}">
-        <p14:creationId xmlns:p14="http://schemas.microsoft.com/office/powerpoint/2010/main" val="2981513233"/>
+        <p14:creationId xmlns:p14="http://schemas.microsoft.com/office/powerpoint/2010/main" val="2544437093"/>
       </p:ext>
     </p:extLst>
   </p:cSld>
@@ -1229,7 +1230,7 @@
     </p:spTree>
     <p:extLst>
       <p:ext uri="{BB962C8B-B14F-4D97-AF65-F5344CB8AC3E}">
-        <p14:creationId xmlns:p14="http://schemas.microsoft.com/office/powerpoint/2010/main" val="2444937474"/>
+        <p14:creationId xmlns:p14="http://schemas.microsoft.com/office/powerpoint/2010/main" val="2981513233"/>
       </p:ext>
     </p:extLst>
   </p:cSld>
@@ -1304,7 +1305,91 @@
           <a:p>
             <a:fld id="{A926901F-C6C3-9E47-9843-744856EDDD7A}" type="slidenum">
               <a:rPr lang="en-US" smtClean="0"/>
-              <a:t>19</a:t>
+              <a:t>18</a:t>
+            </a:fld>
+            <a:endParaRPr lang="en-US"/>
+          </a:p>
+        </p:txBody>
+      </p:sp>
+    </p:spTree>
+    <p:extLst>
+      <p:ext uri="{BB962C8B-B14F-4D97-AF65-F5344CB8AC3E}">
+        <p14:creationId xmlns:p14="http://schemas.microsoft.com/office/powerpoint/2010/main" val="2444937474"/>
+      </p:ext>
+    </p:extLst>
+  </p:cSld>
+  <p:clrMapOvr>
+    <a:masterClrMapping/>
+  </p:clrMapOvr>
+</p:notes>
+</file>
+
+<file path=ppt/notesSlides/notesSlide19.xml><?xml version="1.0" encoding="utf-8"?>
+<p:notes xmlns:a="http://schemas.openxmlformats.org/drawingml/2006/main" xmlns:r="http://schemas.openxmlformats.org/officeDocument/2006/relationships" xmlns:p="http://schemas.openxmlformats.org/presentationml/2006/main">
+  <p:cSld>
+    <p:spTree>
+      <p:nvGrpSpPr>
+        <p:cNvPr id="1" name=""/>
+        <p:cNvGrpSpPr/>
+        <p:nvPr/>
+      </p:nvGrpSpPr>
+      <p:grpSpPr>
+        <a:xfrm>
+          <a:off x="0" y="0"/>
+          <a:ext cx="0" cy="0"/>
+          <a:chOff x="0" y="0"/>
+          <a:chExt cx="0" cy="0"/>
+        </a:xfrm>
+      </p:grpSpPr>
+      <p:sp>
+        <p:nvSpPr>
+          <p:cNvPr id="2" name="Slide Image Placeholder 1"/>
+          <p:cNvSpPr>
+            <a:spLocks noGrp="1" noRot="1" noChangeAspect="1"/>
+          </p:cNvSpPr>
+          <p:nvPr>
+            <p:ph type="sldImg"/>
+          </p:nvPr>
+        </p:nvSpPr>
+        <p:spPr/>
+      </p:sp>
+      <p:sp>
+        <p:nvSpPr>
+          <p:cNvPr id="3" name="Notes Placeholder 2"/>
+          <p:cNvSpPr>
+            <a:spLocks noGrp="1"/>
+          </p:cNvSpPr>
+          <p:nvPr>
+            <p:ph type="body" idx="1"/>
+          </p:nvPr>
+        </p:nvSpPr>
+        <p:spPr/>
+        <p:txBody>
+          <a:bodyPr/>
+          <a:lstStyle/>
+          <a:p>
+            <a:endParaRPr lang="en-US"/>
+          </a:p>
+        </p:txBody>
+      </p:sp>
+      <p:sp>
+        <p:nvSpPr>
+          <p:cNvPr id="4" name="Slide Number Placeholder 3"/>
+          <p:cNvSpPr>
+            <a:spLocks noGrp="1"/>
+          </p:cNvSpPr>
+          <p:nvPr>
+            <p:ph type="sldNum" sz="quarter" idx="5"/>
+          </p:nvPr>
+        </p:nvSpPr>
+        <p:spPr/>
+        <p:txBody>
+          <a:bodyPr/>
+          <a:lstStyle/>
+          <a:p>
+            <a:fld id="{A926901F-C6C3-9E47-9843-744856EDDD7A}" type="slidenum">
+              <a:rPr lang="en-US" smtClean="0"/>
+              <a:t>20</a:t>
             </a:fld>
             <a:endParaRPr lang="en-US"/>
           </a:p>
@@ -1323,7 +1408,115 @@
 </p:notes>
 </file>
 
-<file path=ppt/notesSlides/notesSlide19.xml><?xml version="1.0" encoding="utf-8"?>
+<file path=ppt/notesSlides/notesSlide2.xml><?xml version="1.0" encoding="utf-8"?>
+<p:notes xmlns:a="http://schemas.openxmlformats.org/drawingml/2006/main" xmlns:r="http://schemas.openxmlformats.org/officeDocument/2006/relationships" xmlns:p="http://schemas.openxmlformats.org/presentationml/2006/main">
+  <p:cSld>
+    <p:spTree>
+      <p:nvGrpSpPr>
+        <p:cNvPr id="1" name="">
+          <a:extLst>
+            <a:ext uri="{FF2B5EF4-FFF2-40B4-BE49-F238E27FC236}">
+              <a16:creationId xmlns:a16="http://schemas.microsoft.com/office/drawing/2014/main" id="{6E5C668C-4B5B-8604-2D48-804B97E73672}"/>
+            </a:ext>
+          </a:extLst>
+        </p:cNvPr>
+        <p:cNvGrpSpPr/>
+        <p:nvPr/>
+      </p:nvGrpSpPr>
+      <p:grpSpPr>
+        <a:xfrm>
+          <a:off x="0" y="0"/>
+          <a:ext cx="0" cy="0"/>
+          <a:chOff x="0" y="0"/>
+          <a:chExt cx="0" cy="0"/>
+        </a:xfrm>
+      </p:grpSpPr>
+      <p:sp>
+        <p:nvSpPr>
+          <p:cNvPr id="2" name="Slide Image Placeholder 1">
+            <a:extLst>
+              <a:ext uri="{FF2B5EF4-FFF2-40B4-BE49-F238E27FC236}">
+                <a16:creationId xmlns:a16="http://schemas.microsoft.com/office/drawing/2014/main" id="{E179331F-B80F-1438-C7E8-9C4CBC78F95F}"/>
+              </a:ext>
+            </a:extLst>
+          </p:cNvPr>
+          <p:cNvSpPr>
+            <a:spLocks noGrp="1" noRot="1" noChangeAspect="1"/>
+          </p:cNvSpPr>
+          <p:nvPr>
+            <p:ph type="sldImg"/>
+          </p:nvPr>
+        </p:nvSpPr>
+        <p:spPr/>
+      </p:sp>
+      <p:sp>
+        <p:nvSpPr>
+          <p:cNvPr id="3" name="Notes Placeholder 2">
+            <a:extLst>
+              <a:ext uri="{FF2B5EF4-FFF2-40B4-BE49-F238E27FC236}">
+                <a16:creationId xmlns:a16="http://schemas.microsoft.com/office/drawing/2014/main" id="{CC803184-CDA8-6E65-448B-119FADBA26CB}"/>
+              </a:ext>
+            </a:extLst>
+          </p:cNvPr>
+          <p:cNvSpPr>
+            <a:spLocks noGrp="1"/>
+          </p:cNvSpPr>
+          <p:nvPr>
+            <p:ph type="body" idx="1"/>
+          </p:nvPr>
+        </p:nvSpPr>
+        <p:spPr/>
+        <p:txBody>
+          <a:bodyPr/>
+          <a:lstStyle/>
+          <a:p>
+            <a:endParaRPr lang="en-US" dirty="0"/>
+          </a:p>
+        </p:txBody>
+      </p:sp>
+      <p:sp>
+        <p:nvSpPr>
+          <p:cNvPr id="4" name="Slide Number Placeholder 3">
+            <a:extLst>
+              <a:ext uri="{FF2B5EF4-FFF2-40B4-BE49-F238E27FC236}">
+                <a16:creationId xmlns:a16="http://schemas.microsoft.com/office/drawing/2014/main" id="{DF19BD75-6E2F-B574-4E00-ECFE22069316}"/>
+              </a:ext>
+            </a:extLst>
+          </p:cNvPr>
+          <p:cNvSpPr>
+            <a:spLocks noGrp="1"/>
+          </p:cNvSpPr>
+          <p:nvPr>
+            <p:ph type="sldNum" sz="quarter" idx="5"/>
+          </p:nvPr>
+        </p:nvSpPr>
+        <p:spPr/>
+        <p:txBody>
+          <a:bodyPr/>
+          <a:lstStyle/>
+          <a:p>
+            <a:fld id="{A926901F-C6C3-9E47-9843-744856EDDD7A}" type="slidenum">
+              <a:rPr lang="en-US" smtClean="0"/>
+              <a:t>2</a:t>
+            </a:fld>
+            <a:endParaRPr lang="en-US"/>
+          </a:p>
+        </p:txBody>
+      </p:sp>
+    </p:spTree>
+    <p:extLst>
+      <p:ext uri="{BB962C8B-B14F-4D97-AF65-F5344CB8AC3E}">
+        <p14:creationId xmlns:p14="http://schemas.microsoft.com/office/powerpoint/2010/main" val="1473171497"/>
+      </p:ext>
+    </p:extLst>
+  </p:cSld>
+  <p:clrMapOvr>
+    <a:masterClrMapping/>
+  </p:clrMapOvr>
+</p:notes>
+</file>
+
+<file path=ppt/notesSlides/notesSlide20.xml><?xml version="1.0" encoding="utf-8"?>
 <p:notes xmlns:a="http://schemas.openxmlformats.org/drawingml/2006/main" xmlns:r="http://schemas.openxmlformats.org/officeDocument/2006/relationships" xmlns:p="http://schemas.openxmlformats.org/presentationml/2006/main" showMasterSp="0" showMasterPhAnim="0">
   <p:cSld>
     <p:spTree>
@@ -1460,7 +1653,7 @@
             </a:pPr>
             <a:fld id="{00000000-1234-1234-1234-123412341234}" type="slidenum">
               <a:rPr lang="en-US"/>
-              <a:t>20</a:t>
+              <a:t>21</a:t>
             </a:fld>
             <a:endParaRPr/>
           </a:p>
@@ -1470,90 +1663,6 @@
     <p:extLst>
       <p:ext uri="{BB962C8B-B14F-4D97-AF65-F5344CB8AC3E}">
         <p14:creationId xmlns:p14="http://schemas.microsoft.com/office/powerpoint/2010/main" val="3582667563"/>
-      </p:ext>
-    </p:extLst>
-  </p:cSld>
-  <p:clrMapOvr>
-    <a:masterClrMapping/>
-  </p:clrMapOvr>
-</p:notes>
-</file>
-
-<file path=ppt/notesSlides/notesSlide2.xml><?xml version="1.0" encoding="utf-8"?>
-<p:notes xmlns:a="http://schemas.openxmlformats.org/drawingml/2006/main" xmlns:r="http://schemas.openxmlformats.org/officeDocument/2006/relationships" xmlns:p="http://schemas.openxmlformats.org/presentationml/2006/main">
-  <p:cSld>
-    <p:spTree>
-      <p:nvGrpSpPr>
-        <p:cNvPr id="1" name=""/>
-        <p:cNvGrpSpPr/>
-        <p:nvPr/>
-      </p:nvGrpSpPr>
-      <p:grpSpPr>
-        <a:xfrm>
-          <a:off x="0" y="0"/>
-          <a:ext cx="0" cy="0"/>
-          <a:chOff x="0" y="0"/>
-          <a:chExt cx="0" cy="0"/>
-        </a:xfrm>
-      </p:grpSpPr>
-      <p:sp>
-        <p:nvSpPr>
-          <p:cNvPr id="2" name="Slide Image Placeholder 1"/>
-          <p:cNvSpPr>
-            <a:spLocks noGrp="1" noRot="1" noChangeAspect="1"/>
-          </p:cNvSpPr>
-          <p:nvPr>
-            <p:ph type="sldImg"/>
-          </p:nvPr>
-        </p:nvSpPr>
-        <p:spPr/>
-      </p:sp>
-      <p:sp>
-        <p:nvSpPr>
-          <p:cNvPr id="3" name="Notes Placeholder 2"/>
-          <p:cNvSpPr>
-            <a:spLocks noGrp="1"/>
-          </p:cNvSpPr>
-          <p:nvPr>
-            <p:ph type="body" idx="1"/>
-          </p:nvPr>
-        </p:nvSpPr>
-        <p:spPr/>
-        <p:txBody>
-          <a:bodyPr/>
-          <a:lstStyle/>
-          <a:p>
-            <a:endParaRPr lang="en-US"/>
-          </a:p>
-        </p:txBody>
-      </p:sp>
-      <p:sp>
-        <p:nvSpPr>
-          <p:cNvPr id="4" name="Slide Number Placeholder 3"/>
-          <p:cNvSpPr>
-            <a:spLocks noGrp="1"/>
-          </p:cNvSpPr>
-          <p:nvPr>
-            <p:ph type="sldNum" sz="quarter" idx="5"/>
-          </p:nvPr>
-        </p:nvSpPr>
-        <p:spPr/>
-        <p:txBody>
-          <a:bodyPr/>
-          <a:lstStyle/>
-          <a:p>
-            <a:fld id="{A926901F-C6C3-9E47-9843-744856EDDD7A}" type="slidenum">
-              <a:rPr lang="en-US" smtClean="0"/>
-              <a:t>2</a:t>
-            </a:fld>
-            <a:endParaRPr lang="en-US"/>
-          </a:p>
-        </p:txBody>
-      </p:sp>
-    </p:spTree>
-    <p:extLst>
-      <p:ext uri="{BB962C8B-B14F-4D97-AF65-F5344CB8AC3E}">
-        <p14:creationId xmlns:p14="http://schemas.microsoft.com/office/powerpoint/2010/main" val="136678123"/>
       </p:ext>
     </p:extLst>
   </p:cSld>
@@ -1637,7 +1746,7 @@
     </p:spTree>
     <p:extLst>
       <p:ext uri="{BB962C8B-B14F-4D97-AF65-F5344CB8AC3E}">
-        <p14:creationId xmlns:p14="http://schemas.microsoft.com/office/powerpoint/2010/main" val="186762801"/>
+        <p14:creationId xmlns:p14="http://schemas.microsoft.com/office/powerpoint/2010/main" val="136678123"/>
       </p:ext>
     </p:extLst>
   </p:cSld>
@@ -1721,7 +1830,7 @@
     </p:spTree>
     <p:extLst>
       <p:ext uri="{BB962C8B-B14F-4D97-AF65-F5344CB8AC3E}">
-        <p14:creationId xmlns:p14="http://schemas.microsoft.com/office/powerpoint/2010/main" val="3841164991"/>
+        <p14:creationId xmlns:p14="http://schemas.microsoft.com/office/powerpoint/2010/main" val="186762801"/>
       </p:ext>
     </p:extLst>
   </p:cSld>
@@ -1805,7 +1914,7 @@
     </p:spTree>
     <p:extLst>
       <p:ext uri="{BB962C8B-B14F-4D97-AF65-F5344CB8AC3E}">
-        <p14:creationId xmlns:p14="http://schemas.microsoft.com/office/powerpoint/2010/main" val="1736172450"/>
+        <p14:creationId xmlns:p14="http://schemas.microsoft.com/office/powerpoint/2010/main" val="3841164991"/>
       </p:ext>
     </p:extLst>
   </p:cSld>
@@ -1889,7 +1998,7 @@
     </p:spTree>
     <p:extLst>
       <p:ext uri="{BB962C8B-B14F-4D97-AF65-F5344CB8AC3E}">
-        <p14:creationId xmlns:p14="http://schemas.microsoft.com/office/powerpoint/2010/main" val="574618018"/>
+        <p14:creationId xmlns:p14="http://schemas.microsoft.com/office/powerpoint/2010/main" val="1736172450"/>
       </p:ext>
     </p:extLst>
   </p:cSld>
@@ -1973,7 +2082,7 @@
     </p:spTree>
     <p:extLst>
       <p:ext uri="{BB962C8B-B14F-4D97-AF65-F5344CB8AC3E}">
-        <p14:creationId xmlns:p14="http://schemas.microsoft.com/office/powerpoint/2010/main" val="2250125945"/>
+        <p14:creationId xmlns:p14="http://schemas.microsoft.com/office/powerpoint/2010/main" val="574618018"/>
       </p:ext>
     </p:extLst>
   </p:cSld>
@@ -2057,7 +2166,7 @@
     </p:spTree>
     <p:extLst>
       <p:ext uri="{BB962C8B-B14F-4D97-AF65-F5344CB8AC3E}">
-        <p14:creationId xmlns:p14="http://schemas.microsoft.com/office/powerpoint/2010/main" val="950788537"/>
+        <p14:creationId xmlns:p14="http://schemas.microsoft.com/office/powerpoint/2010/main" val="2250125945"/>
       </p:ext>
     </p:extLst>
   </p:cSld>
@@ -2141,7 +2250,7 @@
     </p:spTree>
     <p:extLst>
       <p:ext uri="{BB962C8B-B14F-4D97-AF65-F5344CB8AC3E}">
-        <p14:creationId xmlns:p14="http://schemas.microsoft.com/office/powerpoint/2010/main" val="3724837669"/>
+        <p14:creationId xmlns:p14="http://schemas.microsoft.com/office/powerpoint/2010/main" val="950788537"/>
       </p:ext>
     </p:extLst>
   </p:cSld>
@@ -3279,7 +3388,7 @@
               <a:rPr lang="en-US" sz="2800" dirty="0">
                 <a:latin typeface="Century Gothic" panose="020B0502020202020204" pitchFamily="34" charset="0"/>
               </a:rPr>
-              <a:t>August 13, 2024</a:t>
+              <a:t>January 08, 2025</a:t>
             </a:r>
           </a:p>
         </p:txBody>
@@ -3308,7 +3417,7 @@
         </p:spPr>
         <p:txBody>
           <a:bodyPr vert="horz" lIns="91440" tIns="45720" rIns="91440" bIns="45720" rtlCol="0" anchor="t">
-            <a:normAutofit fontScale="92500"/>
+            <a:normAutofit fontScale="77500" lnSpcReduction="20000"/>
           </a:bodyPr>
           <a:lstStyle/>
           <a:p>
@@ -3316,7 +3425,7 @@
               <a:rPr lang="en-US" dirty="0">
                 <a:latin typeface="Century Gothic"/>
               </a:rPr>
-              <a:t>Andy Monaghan</a:t>
+              <a:t>Mohal Khandelwal</a:t>
             </a:r>
           </a:p>
           <a:p>
@@ -3324,8 +3433,17 @@
               <a:rPr lang="en-US" dirty="0">
                 <a:latin typeface="Century Gothic"/>
               </a:rPr>
-              <a:t>Contributors: Brandon Reyes, Layla Freeborn, Trevor Hall</a:t>
-            </a:r>
+              <a:t>Contributors: Andrew Monaghan, Brandon Reyes, Layla Freeborn, Michael Schneider, John </a:t>
+            </a:r>
+            <a:r>
+              <a:rPr lang="en-US" dirty="0" err="1">
+                <a:latin typeface="Century Gothic"/>
+              </a:rPr>
+              <a:t>Reiland</a:t>
+            </a:r>
+            <a:endParaRPr lang="en-US" dirty="0">
+              <a:latin typeface="Century Gothic"/>
+            </a:endParaRPr>
           </a:p>
           <a:p>
             <a:endParaRPr lang="en-US" dirty="0">
@@ -3394,7 +3512,7 @@
           <a:p>
             <a:r>
               <a:rPr lang="en-US" dirty="0"/>
-              <a:t>Globus Web-based interface</a:t>
+              <a:t>Globus Demo</a:t>
             </a:r>
           </a:p>
         </p:txBody>
@@ -3417,158 +3535,74 @@
         </p:nvSpPr>
         <p:spPr>
           <a:xfrm>
-            <a:off x="838199" y="1825625"/>
-            <a:ext cx="10651435" cy="4163129"/>
+            <a:off x="770282" y="1927031"/>
+            <a:ext cx="10651435" cy="2420372"/>
           </a:xfrm>
         </p:spPr>
         <p:txBody>
           <a:bodyPr vert="horz" lIns="91440" tIns="45720" rIns="91440" bIns="45720" rtlCol="0" anchor="t">
-            <a:normAutofit lnSpcReduction="10000"/>
+            <a:normAutofit/>
           </a:bodyPr>
           <a:lstStyle/>
           <a:p>
-            <a:pPr marL="0" indent="0">
+            <a:r>
+              <a:rPr lang="en-US" sz="3200" dirty="0"/>
+              <a:t>Logging into the web-based interface for Globus </a:t>
+            </a:r>
+          </a:p>
+          <a:p>
+            <a:pPr lvl="1"/>
+            <a:r>
+              <a:rPr lang="en-US" sz="2400" dirty="0"/>
+              <a:t>Provides a nice GUI for managing files on CURC resources</a:t>
+            </a:r>
+          </a:p>
+          <a:p>
+            <a:pPr marL="457200" lvl="1" indent="0">
               <a:buNone/>
             </a:pPr>
+            <a:endParaRPr lang="en-US" sz="2400" dirty="0"/>
+          </a:p>
+          <a:p>
+            <a:r>
+              <a:rPr lang="en-US" sz="3200" dirty="0"/>
+              <a:t>Installing a Globus Endpoint on your local machine</a:t>
+            </a:r>
+          </a:p>
+          <a:p>
+            <a:pPr lvl="1"/>
+            <a:r>
+              <a:rPr lang="en-US" sz="2400" dirty="0"/>
+              <a:t>Allows you to interact with files on your local machine via Globus</a:t>
+            </a:r>
+          </a:p>
+        </p:txBody>
+      </p:sp>
+      <p:sp>
+        <p:nvSpPr>
+          <p:cNvPr id="4" name="Date Placeholder 3">
+            <a:extLst>
+              <a:ext uri="{FF2B5EF4-FFF2-40B4-BE49-F238E27FC236}">
+                <a16:creationId xmlns:a16="http://schemas.microsoft.com/office/drawing/2014/main" id="{0D20F75C-A166-481E-9B0D-991F7F1D05FB}"/>
+              </a:ext>
+            </a:extLst>
+          </p:cNvPr>
+          <p:cNvSpPr>
+            <a:spLocks noGrp="1"/>
+          </p:cNvSpPr>
+          <p:nvPr>
+            <p:ph type="dt" sz="half" idx="10"/>
+          </p:nvPr>
+        </p:nvSpPr>
+        <p:spPr/>
+        <p:txBody>
+          <a:bodyPr/>
+          <a:lstStyle/>
+          <a:p>
             <a:r>
               <a:rPr lang="en-US" dirty="0"/>
-              <a:t>Globus login is simple and quick</a:t>
-            </a:r>
-          </a:p>
-          <a:p>
-            <a:pPr marL="0" indent="0">
-              <a:buNone/>
-            </a:pPr>
-            <a:endParaRPr lang="en-US" dirty="0"/>
-          </a:p>
-          <a:p>
-            <a:pPr marL="914400" lvl="1" indent="-457200">
-              <a:buFont typeface="+mj-lt"/>
-              <a:buAutoNum type="arabicPeriod"/>
-            </a:pPr>
-            <a:r>
-              <a:rPr lang="en-US" dirty="0">
-                <a:latin typeface="Helvetica"/>
-                <a:cs typeface="Helvetica"/>
-              </a:rPr>
-              <a:t>Navigate to </a:t>
-            </a:r>
-            <a:r>
-              <a:rPr lang="en-US" dirty="0">
-                <a:hlinkClick r:id="rId3"/>
-              </a:rPr>
-              <a:t>https://app.globus.org </a:t>
-            </a:r>
-            <a:endParaRPr lang="en-US" dirty="0"/>
-          </a:p>
-          <a:p>
-            <a:pPr lvl="2"/>
-            <a:r>
-              <a:rPr lang="en-US" dirty="0">
-                <a:latin typeface="Helvetica"/>
-                <a:cs typeface="Helvetica"/>
-              </a:rPr>
-              <a:t>CU Boulder users </a:t>
-            </a:r>
-          </a:p>
-          <a:p>
-            <a:pPr lvl="3"/>
-            <a:r>
-              <a:rPr lang="en-US" dirty="0">
-                <a:latin typeface="Helvetica"/>
-                <a:cs typeface="Helvetica"/>
-              </a:rPr>
-              <a:t>Select “University of Colorado at Boulder” in the dropdown menu</a:t>
-            </a:r>
-          </a:p>
-          <a:p>
-            <a:pPr lvl="2"/>
-            <a:r>
-              <a:rPr lang="en-US" dirty="0">
-                <a:latin typeface="Helvetica"/>
-                <a:cs typeface="Helvetica"/>
-              </a:rPr>
-              <a:t>CSU users</a:t>
-            </a:r>
-          </a:p>
-          <a:p>
-            <a:pPr lvl="3"/>
-            <a:r>
-              <a:rPr lang="en-US" dirty="0">
-                <a:latin typeface="Helvetica"/>
-                <a:cs typeface="Helvetica"/>
-              </a:rPr>
-              <a:t>Select “Colorado State University”</a:t>
-            </a:r>
-          </a:p>
-          <a:p>
-            <a:pPr lvl="2"/>
-            <a:r>
-              <a:rPr lang="en-US" dirty="0">
-                <a:latin typeface="Helvetica"/>
-                <a:cs typeface="Helvetica"/>
-              </a:rPr>
-              <a:t>AMC and RMACC users </a:t>
-            </a:r>
-          </a:p>
-          <a:p>
-            <a:pPr lvl="3"/>
-            <a:r>
-              <a:rPr lang="en-US" dirty="0">
-                <a:latin typeface="Helvetica"/>
-                <a:cs typeface="Helvetica"/>
-              </a:rPr>
-              <a:t>Select “ACCESS CI (formerly XSEDE)”</a:t>
-            </a:r>
-          </a:p>
-          <a:p>
-            <a:pPr marL="914400" lvl="1" indent="-457200">
-              <a:buFont typeface="+mj-lt"/>
-              <a:buAutoNum type="arabicPeriod"/>
-            </a:pPr>
-            <a:r>
-              <a:rPr lang="en-US" dirty="0"/>
-              <a:t>Login with your credentials</a:t>
-            </a:r>
-          </a:p>
-          <a:p>
-            <a:pPr marL="914400" lvl="1" indent="-457200">
-              <a:buFont typeface="+mj-lt"/>
-              <a:buAutoNum type="arabicPeriod"/>
-            </a:pPr>
-            <a:r>
-              <a:rPr lang="en-US" dirty="0"/>
-              <a:t>Continue with onscreen prompts until you are brought to the Globus Web GUI</a:t>
-            </a:r>
-          </a:p>
-        </p:txBody>
-      </p:sp>
-      <p:sp>
-        <p:nvSpPr>
-          <p:cNvPr id="4" name="Date Placeholder 3">
-            <a:extLst>
-              <a:ext uri="{FF2B5EF4-FFF2-40B4-BE49-F238E27FC236}">
-                <a16:creationId xmlns:a16="http://schemas.microsoft.com/office/drawing/2014/main" id="{0D20F75C-A166-481E-9B0D-991F7F1D05FB}"/>
-              </a:ext>
-            </a:extLst>
-          </p:cNvPr>
-          <p:cNvSpPr>
-            <a:spLocks noGrp="1"/>
-          </p:cNvSpPr>
-          <p:nvPr>
-            <p:ph type="dt" sz="half" idx="10"/>
-          </p:nvPr>
-        </p:nvSpPr>
-        <p:spPr/>
-        <p:txBody>
-          <a:bodyPr/>
-          <a:lstStyle/>
-          <a:p>
-            <a:r>
-              <a:rPr lang="en-US"/>
-              <a:t>Data Transfer - 8/13/2024</a:t>
-            </a:r>
-            <a:endParaRPr lang="en-US" dirty="0"/>
+              <a:t>Data Transfer - 1/8/2025</a:t>
+            </a:r>
           </a:p>
         </p:txBody>
       </p:sp>
@@ -3577,7 +3611,7 @@
           <p:cNvPr id="7" name="Slide Number Placeholder 6">
             <a:extLst>
               <a:ext uri="{FF2B5EF4-FFF2-40B4-BE49-F238E27FC236}">
-                <a16:creationId xmlns:a16="http://schemas.microsoft.com/office/drawing/2014/main" id="{E78E84ED-48A3-FC9F-37EA-E33F323783E5}"/>
+                <a16:creationId xmlns:a16="http://schemas.microsoft.com/office/drawing/2014/main" id="{8AA57D2C-F16D-957D-6667-7272E6FF004E}"/>
               </a:ext>
             </a:extLst>
           </p:cNvPr>
@@ -3604,7 +3638,7 @@
     </p:spTree>
     <p:extLst>
       <p:ext uri="{BB962C8B-B14F-4D97-AF65-F5344CB8AC3E}">
-        <p14:creationId xmlns:p14="http://schemas.microsoft.com/office/powerpoint/2010/main" val="288698918"/>
+        <p14:creationId xmlns:p14="http://schemas.microsoft.com/office/powerpoint/2010/main" val="1986419145"/>
       </p:ext>
     </p:extLst>
   </p:cSld>
@@ -3633,43 +3667,174 @@
       </p:grpSpPr>
       <p:sp>
         <p:nvSpPr>
-          <p:cNvPr id="8" name="TextBox 7">
-            <a:extLst>
-              <a:ext uri="{FF2B5EF4-FFF2-40B4-BE49-F238E27FC236}">
-                <a16:creationId xmlns:a16="http://schemas.microsoft.com/office/drawing/2014/main" id="{47A912ED-1A20-747F-8F97-77B311DDC069}"/>
-              </a:ext>
-            </a:extLst>
-          </p:cNvPr>
-          <p:cNvSpPr txBox="1"/>
-          <p:nvPr/>
+          <p:cNvPr id="2" name="Title 1">
+            <a:extLst>
+              <a:ext uri="{FF2B5EF4-FFF2-40B4-BE49-F238E27FC236}">
+                <a16:creationId xmlns:a16="http://schemas.microsoft.com/office/drawing/2014/main" id="{3DEFC202-DADB-4548-8531-414B1195F75D}"/>
+              </a:ext>
+            </a:extLst>
+          </p:cNvPr>
+          <p:cNvSpPr>
+            <a:spLocks noGrp="1"/>
+          </p:cNvSpPr>
+          <p:nvPr>
+            <p:ph type="title"/>
+          </p:nvPr>
+        </p:nvSpPr>
+        <p:spPr/>
+        <p:txBody>
+          <a:bodyPr>
+            <a:normAutofit/>
+          </a:bodyPr>
+          <a:lstStyle/>
+          <a:p>
+            <a:r>
+              <a:rPr lang="en-US" dirty="0"/>
+              <a:t>Globus Web-based interface</a:t>
+            </a:r>
+          </a:p>
+        </p:txBody>
+      </p:sp>
+      <p:sp>
+        <p:nvSpPr>
+          <p:cNvPr id="3" name="Content Placeholder 2">
+            <a:extLst>
+              <a:ext uri="{FF2B5EF4-FFF2-40B4-BE49-F238E27FC236}">
+                <a16:creationId xmlns:a16="http://schemas.microsoft.com/office/drawing/2014/main" id="{1A1E7F7A-C855-4D2B-97B5-8656E98D3BBE}"/>
+              </a:ext>
+            </a:extLst>
+          </p:cNvPr>
+          <p:cNvSpPr>
+            <a:spLocks noGrp="1"/>
+          </p:cNvSpPr>
+          <p:nvPr>
+            <p:ph idx="1"/>
+          </p:nvPr>
         </p:nvSpPr>
         <p:spPr>
           <a:xfrm>
-            <a:off x="2706094" y="1797784"/>
-            <a:ext cx="6096000" cy="1631216"/>
+            <a:off x="838199" y="1754375"/>
+            <a:ext cx="10651435" cy="4163129"/>
           </a:xfrm>
-          <a:prstGeom prst="rect">
-            <a:avLst/>
-          </a:prstGeom>
-          <a:noFill/>
         </p:spPr>
         <p:txBody>
-          <a:bodyPr wrap="square">
-            <a:spAutoFit/>
+          <a:bodyPr vert="horz" lIns="91440" tIns="45720" rIns="91440" bIns="45720" rtlCol="0" anchor="t">
+            <a:normAutofit lnSpcReduction="10000"/>
           </a:bodyPr>
           <a:lstStyle/>
           <a:p>
-            <a:pPr algn="ctr"/>
-            <a:r>
-              <a:rPr lang="en-US" sz="6000" dirty="0"/>
-              <a:t>Globus Web GUI</a:t>
-            </a:r>
-          </a:p>
-          <a:p>
-            <a:pPr algn="ctr"/>
-            <a:r>
-              <a:rPr lang="en-US" sz="4000" dirty="0"/>
-              <a:t>Let’s take a look!</a:t>
+            <a:pPr marL="0" indent="0">
+              <a:buNone/>
+            </a:pPr>
+            <a:r>
+              <a:rPr lang="en-US" dirty="0"/>
+              <a:t>Globus login is simple and quick</a:t>
+            </a:r>
+          </a:p>
+          <a:p>
+            <a:pPr marL="0" indent="0">
+              <a:buNone/>
+            </a:pPr>
+            <a:endParaRPr lang="en-US" dirty="0"/>
+          </a:p>
+          <a:p>
+            <a:pPr marL="914400" lvl="1" indent="-457200">
+              <a:buFont typeface="+mj-lt"/>
+              <a:buAutoNum type="arabicPeriod"/>
+            </a:pPr>
+            <a:r>
+              <a:rPr lang="en-US" dirty="0">
+                <a:latin typeface="Helvetica"/>
+                <a:cs typeface="Helvetica"/>
+              </a:rPr>
+              <a:t>Navigate to </a:t>
+            </a:r>
+            <a:r>
+              <a:rPr lang="en-US" dirty="0">
+                <a:hlinkClick r:id="rId3"/>
+              </a:rPr>
+              <a:t>https://app.globus.org </a:t>
+            </a:r>
+            <a:endParaRPr lang="en-US" dirty="0"/>
+          </a:p>
+          <a:p>
+            <a:pPr lvl="2"/>
+            <a:r>
+              <a:rPr lang="en-US" dirty="0">
+                <a:latin typeface="Helvetica"/>
+                <a:cs typeface="Helvetica"/>
+              </a:rPr>
+              <a:t>CU Boulder users </a:t>
+            </a:r>
+          </a:p>
+          <a:p>
+            <a:pPr lvl="3"/>
+            <a:r>
+              <a:rPr lang="en-US" dirty="0">
+                <a:latin typeface="Helvetica"/>
+                <a:cs typeface="Helvetica"/>
+              </a:rPr>
+              <a:t>Select “University of Colorado at Boulder” in the dropdown menu</a:t>
+            </a:r>
+          </a:p>
+          <a:p>
+            <a:pPr lvl="2"/>
+            <a:r>
+              <a:rPr lang="en-US" dirty="0">
+                <a:latin typeface="Helvetica"/>
+                <a:cs typeface="Helvetica"/>
+              </a:rPr>
+              <a:t>CSU users</a:t>
+            </a:r>
+          </a:p>
+          <a:p>
+            <a:pPr lvl="3"/>
+            <a:r>
+              <a:rPr lang="en-US" dirty="0">
+                <a:latin typeface="Helvetica"/>
+                <a:cs typeface="Helvetica"/>
+              </a:rPr>
+              <a:t>Select “Colorado State University”</a:t>
+            </a:r>
+          </a:p>
+          <a:p>
+            <a:pPr lvl="2"/>
+            <a:r>
+              <a:rPr lang="en-US" dirty="0">
+                <a:latin typeface="Helvetica"/>
+                <a:cs typeface="Helvetica"/>
+              </a:rPr>
+              <a:t>AMC and RMACC users </a:t>
+            </a:r>
+          </a:p>
+          <a:p>
+            <a:pPr lvl="3"/>
+            <a:r>
+              <a:rPr lang="en-US" dirty="0">
+                <a:latin typeface="Helvetica"/>
+                <a:cs typeface="Helvetica"/>
+              </a:rPr>
+              <a:t>Select “ACCESS CI (formerly XSEDE)”</a:t>
+            </a:r>
+          </a:p>
+          <a:p>
+            <a:pPr marL="914400" lvl="1" indent="-457200">
+              <a:buFont typeface="+mj-lt"/>
+              <a:buAutoNum type="arabicPeriod"/>
+            </a:pPr>
+            <a:r>
+              <a:rPr lang="en-US" dirty="0"/>
+              <a:t>Login with your credentials</a:t>
+            </a:r>
+          </a:p>
+          <a:p>
+            <a:pPr marL="914400" lvl="1" indent="-457200">
+              <a:buFont typeface="+mj-lt"/>
+              <a:buAutoNum type="arabicPeriod"/>
+            </a:pPr>
+            <a:r>
+              <a:rPr lang="en-US" dirty="0"/>
+              <a:t>Continue with onscreen prompts until you are brought to the Globus Web GUI</a:t>
             </a:r>
           </a:p>
         </p:txBody>
@@ -3679,7 +3844,7 @@
           <p:cNvPr id="4" name="Date Placeholder 3">
             <a:extLst>
               <a:ext uri="{FF2B5EF4-FFF2-40B4-BE49-F238E27FC236}">
-                <a16:creationId xmlns:a16="http://schemas.microsoft.com/office/drawing/2014/main" id="{1EC90EC7-8408-23FA-B291-70F16C8E9A06}"/>
+                <a16:creationId xmlns:a16="http://schemas.microsoft.com/office/drawing/2014/main" id="{0D20F75C-A166-481E-9B0D-991F7F1D05FB}"/>
               </a:ext>
             </a:extLst>
           </p:cNvPr>
@@ -3696,19 +3861,18 @@
           <a:lstStyle/>
           <a:p>
             <a:r>
-              <a:rPr lang="en-US"/>
-              <a:t>Data Transfer - 8/13/2024</a:t>
-            </a:r>
-            <a:endParaRPr lang="en-US" dirty="0"/>
-          </a:p>
-        </p:txBody>
-      </p:sp>
-      <p:sp>
-        <p:nvSpPr>
-          <p:cNvPr id="2" name="Slide Number Placeholder 1">
-            <a:extLst>
-              <a:ext uri="{FF2B5EF4-FFF2-40B4-BE49-F238E27FC236}">
-                <a16:creationId xmlns:a16="http://schemas.microsoft.com/office/drawing/2014/main" id="{068100EC-52C3-BBE2-E393-72386269F3B6}"/>
+              <a:rPr lang="en-US" dirty="0"/>
+              <a:t>Data Transfer - 1/8/2025</a:t>
+            </a:r>
+          </a:p>
+        </p:txBody>
+      </p:sp>
+      <p:sp>
+        <p:nvSpPr>
+          <p:cNvPr id="7" name="Slide Number Placeholder 6">
+            <a:extLst>
+              <a:ext uri="{FF2B5EF4-FFF2-40B4-BE49-F238E27FC236}">
+                <a16:creationId xmlns:a16="http://schemas.microsoft.com/office/drawing/2014/main" id="{E78E84ED-48A3-FC9F-37EA-E33F323783E5}"/>
               </a:ext>
             </a:extLst>
           </p:cNvPr>
@@ -3724,7 +3888,7 @@
           <a:bodyPr/>
           <a:lstStyle/>
           <a:p>
-            <a:fld id="{DD321DBF-325B-3546-BAAF-4F6E3B3181FF}" type="slidenum">
+            <a:fld id="{ABDA560F-461C-6043-9BC4-489BA92F7161}" type="slidenum">
               <a:rPr lang="en-US" smtClean="0"/>
               <a:t>11</a:t>
             </a:fld>
@@ -3735,7 +3899,7 @@
     </p:spTree>
     <p:extLst>
       <p:ext uri="{BB962C8B-B14F-4D97-AF65-F5344CB8AC3E}">
-        <p14:creationId xmlns:p14="http://schemas.microsoft.com/office/powerpoint/2010/main" val="2139857452"/>
+        <p14:creationId xmlns:p14="http://schemas.microsoft.com/office/powerpoint/2010/main" val="288698918"/>
       </p:ext>
     </p:extLst>
   </p:cSld>
@@ -3764,6 +3928,136 @@
       </p:grpSpPr>
       <p:sp>
         <p:nvSpPr>
+          <p:cNvPr id="8" name="TextBox 7">
+            <a:extLst>
+              <a:ext uri="{FF2B5EF4-FFF2-40B4-BE49-F238E27FC236}">
+                <a16:creationId xmlns:a16="http://schemas.microsoft.com/office/drawing/2014/main" id="{47A912ED-1A20-747F-8F97-77B311DDC069}"/>
+              </a:ext>
+            </a:extLst>
+          </p:cNvPr>
+          <p:cNvSpPr txBox="1"/>
+          <p:nvPr/>
+        </p:nvSpPr>
+        <p:spPr>
+          <a:xfrm>
+            <a:off x="2706094" y="1797784"/>
+            <a:ext cx="6096000" cy="1631216"/>
+          </a:xfrm>
+          <a:prstGeom prst="rect">
+            <a:avLst/>
+          </a:prstGeom>
+          <a:noFill/>
+        </p:spPr>
+        <p:txBody>
+          <a:bodyPr wrap="square">
+            <a:spAutoFit/>
+          </a:bodyPr>
+          <a:lstStyle/>
+          <a:p>
+            <a:pPr algn="ctr"/>
+            <a:r>
+              <a:rPr lang="en-US" sz="6000" dirty="0"/>
+              <a:t>Globus Web GUI</a:t>
+            </a:r>
+          </a:p>
+          <a:p>
+            <a:pPr algn="ctr"/>
+            <a:r>
+              <a:rPr lang="en-US" sz="4000" dirty="0"/>
+              <a:t>Let’s take a look!</a:t>
+            </a:r>
+          </a:p>
+        </p:txBody>
+      </p:sp>
+      <p:sp>
+        <p:nvSpPr>
+          <p:cNvPr id="4" name="Date Placeholder 3">
+            <a:extLst>
+              <a:ext uri="{FF2B5EF4-FFF2-40B4-BE49-F238E27FC236}">
+                <a16:creationId xmlns:a16="http://schemas.microsoft.com/office/drawing/2014/main" id="{1EC90EC7-8408-23FA-B291-70F16C8E9A06}"/>
+              </a:ext>
+            </a:extLst>
+          </p:cNvPr>
+          <p:cNvSpPr>
+            <a:spLocks noGrp="1"/>
+          </p:cNvSpPr>
+          <p:nvPr>
+            <p:ph type="dt" sz="half" idx="10"/>
+          </p:nvPr>
+        </p:nvSpPr>
+        <p:spPr/>
+        <p:txBody>
+          <a:bodyPr/>
+          <a:lstStyle/>
+          <a:p>
+            <a:r>
+              <a:rPr lang="en-US" dirty="0"/>
+              <a:t>Data Transfer - 1/8/2025</a:t>
+            </a:r>
+          </a:p>
+        </p:txBody>
+      </p:sp>
+      <p:sp>
+        <p:nvSpPr>
+          <p:cNvPr id="2" name="Slide Number Placeholder 1">
+            <a:extLst>
+              <a:ext uri="{FF2B5EF4-FFF2-40B4-BE49-F238E27FC236}">
+                <a16:creationId xmlns:a16="http://schemas.microsoft.com/office/drawing/2014/main" id="{068100EC-52C3-BBE2-E393-72386269F3B6}"/>
+              </a:ext>
+            </a:extLst>
+          </p:cNvPr>
+          <p:cNvSpPr>
+            <a:spLocks noGrp="1"/>
+          </p:cNvSpPr>
+          <p:nvPr>
+            <p:ph type="sldNum" sz="quarter" idx="12"/>
+          </p:nvPr>
+        </p:nvSpPr>
+        <p:spPr/>
+        <p:txBody>
+          <a:bodyPr/>
+          <a:lstStyle/>
+          <a:p>
+            <a:fld id="{DD321DBF-325B-3546-BAAF-4F6E3B3181FF}" type="slidenum">
+              <a:rPr lang="en-US" smtClean="0"/>
+              <a:t>12</a:t>
+            </a:fld>
+            <a:endParaRPr lang="en-US"/>
+          </a:p>
+        </p:txBody>
+      </p:sp>
+    </p:spTree>
+    <p:extLst>
+      <p:ext uri="{BB962C8B-B14F-4D97-AF65-F5344CB8AC3E}">
+        <p14:creationId xmlns:p14="http://schemas.microsoft.com/office/powerpoint/2010/main" val="2139857452"/>
+      </p:ext>
+    </p:extLst>
+  </p:cSld>
+  <p:clrMapOvr>
+    <a:masterClrMapping/>
+  </p:clrMapOvr>
+</p:sld>
+</file>
+
+<file path=ppt/slides/slide13.xml><?xml version="1.0" encoding="utf-8"?>
+<p:sld xmlns:a="http://schemas.openxmlformats.org/drawingml/2006/main" xmlns:r="http://schemas.openxmlformats.org/officeDocument/2006/relationships" xmlns:p="http://schemas.openxmlformats.org/presentationml/2006/main">
+  <p:cSld>
+    <p:spTree>
+      <p:nvGrpSpPr>
+        <p:cNvPr id="1" name=""/>
+        <p:cNvGrpSpPr/>
+        <p:nvPr/>
+      </p:nvGrpSpPr>
+      <p:grpSpPr>
+        <a:xfrm>
+          <a:off x="0" y="0"/>
+          <a:ext cx="0" cy="0"/>
+          <a:chOff x="0" y="0"/>
+          <a:chExt cx="0" cy="0"/>
+        </a:xfrm>
+      </p:grpSpPr>
+      <p:sp>
+        <p:nvSpPr>
           <p:cNvPr id="2" name="Title 1">
             <a:extLst>
               <a:ext uri="{FF2B5EF4-FFF2-40B4-BE49-F238E27FC236}">
@@ -3895,10 +4189,9 @@
           <a:lstStyle/>
           <a:p>
             <a:r>
-              <a:rPr lang="en-US"/>
-              <a:t>Data Transfer - 8/13/2024</a:t>
-            </a:r>
-            <a:endParaRPr lang="en-US" dirty="0"/>
+              <a:rPr lang="en-US" dirty="0"/>
+              <a:t>Data Transfer - 1/8/2025</a:t>
+            </a:r>
           </a:p>
         </p:txBody>
       </p:sp>
@@ -3925,7 +4218,7 @@
           <a:p>
             <a:fld id="{ABDA560F-461C-6043-9BC4-489BA92F7161}" type="slidenum">
               <a:rPr lang="en-US" smtClean="0"/>
-              <a:t>12</a:t>
+              <a:t>13</a:t>
             </a:fld>
             <a:endParaRPr lang="en-US"/>
           </a:p>
@@ -3944,7 +4237,7 @@
 </p:sld>
 </file>
 
-<file path=ppt/slides/slide13.xml><?xml version="1.0" encoding="utf-8"?>
+<file path=ppt/slides/slide14.xml><?xml version="1.0" encoding="utf-8"?>
 <p:sld xmlns:a="http://schemas.openxmlformats.org/drawingml/2006/main" xmlns:r="http://schemas.openxmlformats.org/officeDocument/2006/relationships" xmlns:p="http://schemas.openxmlformats.org/presentationml/2006/main">
   <p:cSld>
     <p:spTree>
@@ -4318,10 +4611,9 @@
           <a:lstStyle/>
           <a:p>
             <a:r>
-              <a:rPr lang="en-US"/>
-              <a:t>Data Transfer - 8/13/2024</a:t>
-            </a:r>
-            <a:endParaRPr lang="en-US" dirty="0"/>
+              <a:rPr lang="en-US" dirty="0"/>
+              <a:t>Data Transfer - 1/8/2025</a:t>
+            </a:r>
           </a:p>
         </p:txBody>
       </p:sp>
@@ -4348,7 +4640,7 @@
           <a:p>
             <a:fld id="{ABDA560F-461C-6043-9BC4-489BA92F7161}" type="slidenum">
               <a:rPr lang="en-US" smtClean="0"/>
-              <a:t>13</a:t>
+              <a:t>14</a:t>
             </a:fld>
             <a:endParaRPr lang="en-US"/>
           </a:p>
@@ -4367,7 +4659,7 @@
 </p:sld>
 </file>
 
-<file path=ppt/slides/slide14.xml><?xml version="1.0" encoding="utf-8"?>
+<file path=ppt/slides/slide15.xml><?xml version="1.0" encoding="utf-8"?>
 <p:sld xmlns:a="http://schemas.openxmlformats.org/drawingml/2006/main" xmlns:r="http://schemas.openxmlformats.org/officeDocument/2006/relationships" xmlns:p="http://schemas.openxmlformats.org/presentationml/2006/main">
   <p:cSld>
     <p:spTree>
@@ -4727,10 +5019,9 @@
           <a:lstStyle/>
           <a:p>
             <a:r>
-              <a:rPr lang="en-US"/>
-              <a:t>Data Transfer - 8/13/2024</a:t>
-            </a:r>
-            <a:endParaRPr lang="en-US" dirty="0"/>
+              <a:rPr lang="en-US" dirty="0"/>
+              <a:t>Data Transfer - 1/8/2025</a:t>
+            </a:r>
           </a:p>
         </p:txBody>
       </p:sp>
@@ -4757,7 +5048,7 @@
           <a:p>
             <a:fld id="{ABDA560F-461C-6043-9BC4-489BA92F7161}" type="slidenum">
               <a:rPr lang="en-US" smtClean="0"/>
-              <a:t>14</a:t>
+              <a:t>15</a:t>
             </a:fld>
             <a:endParaRPr lang="en-US"/>
           </a:p>
@@ -4776,7 +5067,7 @@
 </p:sld>
 </file>
 
-<file path=ppt/slides/slide15.xml><?xml version="1.0" encoding="utf-8"?>
+<file path=ppt/slides/slide16.xml><?xml version="1.0" encoding="utf-8"?>
 <p:sld xmlns:a="http://schemas.openxmlformats.org/drawingml/2006/main" xmlns:r="http://schemas.openxmlformats.org/officeDocument/2006/relationships" xmlns:p="http://schemas.openxmlformats.org/presentationml/2006/main">
   <p:cSld>
     <p:spTree>
@@ -4851,10 +5142,9 @@
           <a:lstStyle/>
           <a:p>
             <a:r>
-              <a:rPr lang="en-US"/>
-              <a:t>Data Transfer - 8/13/2024</a:t>
-            </a:r>
-            <a:endParaRPr lang="en-US" dirty="0"/>
+              <a:rPr lang="en-US" dirty="0"/>
+              <a:t>Data Transfer - 1/8/2025</a:t>
+            </a:r>
           </a:p>
         </p:txBody>
       </p:sp>
@@ -4881,7 +5171,7 @@
           <a:p>
             <a:fld id="{DD321DBF-325B-3546-BAAF-4F6E3B3181FF}" type="slidenum">
               <a:rPr lang="en-US" smtClean="0"/>
-              <a:t>15</a:t>
+              <a:t>16</a:t>
             </a:fld>
             <a:endParaRPr lang="en-US"/>
           </a:p>
@@ -4900,7 +5190,7 @@
 </p:sld>
 </file>
 
-<file path=ppt/slides/slide16.xml><?xml version="1.0" encoding="utf-8"?>
+<file path=ppt/slides/slide17.xml><?xml version="1.0" encoding="utf-8"?>
 <p:sld xmlns:a="http://schemas.openxmlformats.org/drawingml/2006/main" xmlns:r="http://schemas.openxmlformats.org/officeDocument/2006/relationships" xmlns:p="http://schemas.openxmlformats.org/presentationml/2006/main">
   <p:cSld>
     <p:spTree>
@@ -5639,10 +5929,9 @@
           <a:lstStyle/>
           <a:p>
             <a:r>
-              <a:rPr lang="en-US"/>
-              <a:t>Data Transfer - 8/13/2024</a:t>
-            </a:r>
-            <a:endParaRPr lang="en-US" dirty="0"/>
+              <a:rPr lang="en-US" dirty="0"/>
+              <a:t>Data Transfer - 1/8/2025</a:t>
+            </a:r>
           </a:p>
         </p:txBody>
       </p:sp>
@@ -5669,7 +5958,7 @@
           <a:p>
             <a:fld id="{DD321DBF-325B-3546-BAAF-4F6E3B3181FF}" type="slidenum">
               <a:rPr lang="en-US" smtClean="0"/>
-              <a:t>16</a:t>
+              <a:t>17</a:t>
             </a:fld>
             <a:endParaRPr lang="en-US"/>
           </a:p>
@@ -5688,7 +5977,7 @@
 </p:sld>
 </file>
 
-<file path=ppt/slides/slide17.xml><?xml version="1.0" encoding="utf-8"?>
+<file path=ppt/slides/slide18.xml><?xml version="1.0" encoding="utf-8"?>
 <p:sld xmlns:a="http://schemas.openxmlformats.org/drawingml/2006/main" xmlns:r="http://schemas.openxmlformats.org/officeDocument/2006/relationships" xmlns:p="http://schemas.openxmlformats.org/presentationml/2006/main">
   <p:cSld>
     <p:spTree>
@@ -6279,12 +6568,16 @@
           <a:lstStyle/>
           <a:p>
             <a:r>
-              <a:rPr lang="en-US">
+              <a:rPr lang="en-US" dirty="0">
                 <a:solidFill>
                   <a:schemeClr val="tx1"/>
                 </a:solidFill>
               </a:rPr>
-              <a:t>Data Transfer - 8/13/2024</a:t>
+              <a:t>Data Transfer - </a:t>
+            </a:r>
+            <a:r>
+              <a:rPr lang="en-US" dirty="0"/>
+              <a:t>1/8/2025</a:t>
             </a:r>
             <a:endParaRPr lang="en-US" dirty="0">
               <a:solidFill>
@@ -6325,7 +6618,7 @@
                   <a:schemeClr val="tx1"/>
                 </a:solidFill>
               </a:rPr>
-              <a:t>17</a:t>
+              <a:t>18</a:t>
             </a:fld>
             <a:endParaRPr lang="en-US">
               <a:solidFill>
@@ -6339,232 +6632,6 @@
     <p:extLst>
       <p:ext uri="{BB962C8B-B14F-4D97-AF65-F5344CB8AC3E}">
         <p14:creationId xmlns:p14="http://schemas.microsoft.com/office/powerpoint/2010/main" val="2674537354"/>
-      </p:ext>
-    </p:extLst>
-  </p:cSld>
-  <p:clrMapOvr>
-    <a:masterClrMapping/>
-  </p:clrMapOvr>
-</p:sld>
-</file>
-
-<file path=ppt/slides/slide18.xml><?xml version="1.0" encoding="utf-8"?>
-<p:sld xmlns:a="http://schemas.openxmlformats.org/drawingml/2006/main" xmlns:r="http://schemas.openxmlformats.org/officeDocument/2006/relationships" xmlns:p="http://schemas.openxmlformats.org/presentationml/2006/main">
-  <p:cSld>
-    <p:spTree>
-      <p:nvGrpSpPr>
-        <p:cNvPr id="1" name=""/>
-        <p:cNvGrpSpPr/>
-        <p:nvPr/>
-      </p:nvGrpSpPr>
-      <p:grpSpPr>
-        <a:xfrm>
-          <a:off x="0" y="0"/>
-          <a:ext cx="0" cy="0"/>
-          <a:chOff x="0" y="0"/>
-          <a:chExt cx="0" cy="0"/>
-        </a:xfrm>
-      </p:grpSpPr>
-      <p:sp>
-        <p:nvSpPr>
-          <p:cNvPr id="2" name="Title 1">
-            <a:extLst>
-              <a:ext uri="{FF2B5EF4-FFF2-40B4-BE49-F238E27FC236}">
-                <a16:creationId xmlns:a16="http://schemas.microsoft.com/office/drawing/2014/main" id="{D890A8D5-78D0-45DC-A1A9-B38B955BA441}"/>
-              </a:ext>
-            </a:extLst>
-          </p:cNvPr>
-          <p:cNvSpPr>
-            <a:spLocks noGrp="1"/>
-          </p:cNvSpPr>
-          <p:nvPr>
-            <p:ph type="title"/>
-          </p:nvPr>
-        </p:nvSpPr>
-        <p:spPr>
-          <a:xfrm>
-            <a:off x="417095" y="365125"/>
-            <a:ext cx="10936705" cy="1325563"/>
-          </a:xfrm>
-        </p:spPr>
-        <p:txBody>
-          <a:bodyPr/>
-          <a:lstStyle/>
-          <a:p>
-            <a:r>
-              <a:rPr lang="en-US" dirty="0"/>
-              <a:t>Advanced topic: Globus Shared Endpoints</a:t>
-            </a:r>
-          </a:p>
-        </p:txBody>
-      </p:sp>
-      <p:sp>
-        <p:nvSpPr>
-          <p:cNvPr id="3" name="Content Placeholder 2">
-            <a:extLst>
-              <a:ext uri="{FF2B5EF4-FFF2-40B4-BE49-F238E27FC236}">
-                <a16:creationId xmlns:a16="http://schemas.microsoft.com/office/drawing/2014/main" id="{E437D284-E949-488F-AEA2-34685743F886}"/>
-              </a:ext>
-            </a:extLst>
-          </p:cNvPr>
-          <p:cNvSpPr>
-            <a:spLocks noGrp="1"/>
-          </p:cNvSpPr>
-          <p:nvPr>
-            <p:ph idx="1"/>
-          </p:nvPr>
-        </p:nvSpPr>
-        <p:spPr/>
-        <p:txBody>
-          <a:bodyPr vert="horz" lIns="91440" tIns="45720" rIns="91440" bIns="45720" rtlCol="0" anchor="t">
-            <a:normAutofit fontScale="92500"/>
-          </a:bodyPr>
-          <a:lstStyle/>
-          <a:p>
-            <a:r>
-              <a:rPr lang="en-US" dirty="0">
-                <a:latin typeface="Helvetica"/>
-                <a:cs typeface="Helvetica"/>
-              </a:rPr>
-              <a:t>Globus offers ‘shared endpoints’, which allow you to share your data with external collaborators (i.e. you can share data with people who don't have CURC accounts)</a:t>
-            </a:r>
-          </a:p>
-          <a:p>
-            <a:r>
-              <a:rPr lang="en-US" dirty="0">
-                <a:latin typeface="Helvetica"/>
-                <a:cs typeface="Helvetica"/>
-              </a:rPr>
-              <a:t>CURC provides this capability, however, it is only available for </a:t>
-            </a:r>
-            <a:r>
-              <a:rPr lang="en-US" u="sng" dirty="0" err="1">
-                <a:latin typeface="Helvetica"/>
-                <a:cs typeface="Helvetica"/>
-              </a:rPr>
-              <a:t>PetaLibrary</a:t>
-            </a:r>
-            <a:r>
-              <a:rPr lang="en-US" u="sng" dirty="0">
-                <a:latin typeface="Helvetica"/>
-                <a:cs typeface="Helvetica"/>
-              </a:rPr>
-              <a:t> customers</a:t>
-            </a:r>
-          </a:p>
-          <a:p>
-            <a:r>
-              <a:rPr lang="en-US" dirty="0"/>
-              <a:t>Shared Endpoints generate a shared collection that can be accessed with a link</a:t>
-            </a:r>
-          </a:p>
-          <a:p>
-            <a:pPr lvl="1"/>
-            <a:r>
-              <a:rPr lang="en-US" dirty="0"/>
-              <a:t>For an example, see </a:t>
-            </a:r>
-            <a:r>
-              <a:rPr lang="en-US" b="0" i="0" u="none" strike="noStrike" dirty="0">
-                <a:effectLst/>
-                <a:latin typeface="Slack-Lato"/>
-                <a:hlinkClick r:id="rId2"/>
-              </a:rPr>
-              <a:t>https://scholar.colorado.edu/concern/datasets/9593tw13k</a:t>
-            </a:r>
-            <a:endParaRPr lang="en-US" dirty="0"/>
-          </a:p>
-          <a:p>
-            <a:pPr lvl="1"/>
-            <a:r>
-              <a:rPr lang="en-US" dirty="0"/>
-              <a:t>You can assign various permissions to specific users or all users within Globus</a:t>
-            </a:r>
-          </a:p>
-          <a:p>
-            <a:pPr lvl="1"/>
-            <a:r>
-              <a:rPr lang="en-US" dirty="0"/>
-              <a:t>More information is provided at </a:t>
-            </a:r>
-            <a:r>
-              <a:rPr lang="en-US" dirty="0">
-                <a:hlinkClick r:id="rId3"/>
-              </a:rPr>
-              <a:t>https://docs.globus.org/how-to/share-files/</a:t>
-            </a:r>
-            <a:endParaRPr lang="en-US" dirty="0"/>
-          </a:p>
-          <a:p>
-            <a:pPr marL="0" indent="0">
-              <a:buNone/>
-            </a:pPr>
-            <a:endParaRPr lang="en-US" dirty="0"/>
-          </a:p>
-        </p:txBody>
-      </p:sp>
-      <p:sp>
-        <p:nvSpPr>
-          <p:cNvPr id="4" name="Date Placeholder 3">
-            <a:extLst>
-              <a:ext uri="{FF2B5EF4-FFF2-40B4-BE49-F238E27FC236}">
-                <a16:creationId xmlns:a16="http://schemas.microsoft.com/office/drawing/2014/main" id="{3BF07BAE-E9F1-45A4-BA07-2610004AF5E3}"/>
-              </a:ext>
-            </a:extLst>
-          </p:cNvPr>
-          <p:cNvSpPr>
-            <a:spLocks noGrp="1"/>
-          </p:cNvSpPr>
-          <p:nvPr>
-            <p:ph type="dt" sz="half" idx="10"/>
-          </p:nvPr>
-        </p:nvSpPr>
-        <p:spPr/>
-        <p:txBody>
-          <a:bodyPr/>
-          <a:lstStyle/>
-          <a:p>
-            <a:r>
-              <a:rPr lang="en-US"/>
-              <a:t>Data Transfer - 8/13/2024</a:t>
-            </a:r>
-            <a:endParaRPr lang="en-US" dirty="0"/>
-          </a:p>
-        </p:txBody>
-      </p:sp>
-      <p:sp>
-        <p:nvSpPr>
-          <p:cNvPr id="7" name="Slide Number Placeholder 6">
-            <a:extLst>
-              <a:ext uri="{FF2B5EF4-FFF2-40B4-BE49-F238E27FC236}">
-                <a16:creationId xmlns:a16="http://schemas.microsoft.com/office/drawing/2014/main" id="{DE23A06D-BFE0-FCEE-3B87-B5F9739EA177}"/>
-              </a:ext>
-            </a:extLst>
-          </p:cNvPr>
-          <p:cNvSpPr>
-            <a:spLocks noGrp="1"/>
-          </p:cNvSpPr>
-          <p:nvPr>
-            <p:ph type="sldNum" sz="quarter" idx="12"/>
-          </p:nvPr>
-        </p:nvSpPr>
-        <p:spPr/>
-        <p:txBody>
-          <a:bodyPr/>
-          <a:lstStyle/>
-          <a:p>
-            <a:fld id="{ABDA560F-461C-6043-9BC4-489BA92F7161}" type="slidenum">
-              <a:rPr lang="en-US" smtClean="0"/>
-              <a:t>18</a:t>
-            </a:fld>
-            <a:endParaRPr lang="en-US"/>
-          </a:p>
-        </p:txBody>
-      </p:sp>
-    </p:spTree>
-    <p:extLst>
-      <p:ext uri="{BB962C8B-B14F-4D97-AF65-F5344CB8AC3E}">
-        <p14:creationId xmlns:p14="http://schemas.microsoft.com/office/powerpoint/2010/main" val="2910004548"/>
       </p:ext>
     </p:extLst>
   </p:cSld>
@@ -6596,7 +6663,7 @@
           <p:cNvPr id="2" name="Title 1">
             <a:extLst>
               <a:ext uri="{FF2B5EF4-FFF2-40B4-BE49-F238E27FC236}">
-                <a16:creationId xmlns:a16="http://schemas.microsoft.com/office/drawing/2014/main" id="{A421DF4B-7AA2-8B40-8162-39DDF5CC3981}"/>
+                <a16:creationId xmlns:a16="http://schemas.microsoft.com/office/drawing/2014/main" id="{D890A8D5-78D0-45DC-A1A9-B38B955BA441}"/>
               </a:ext>
             </a:extLst>
           </p:cNvPr>
@@ -6607,14 +6674,19 @@
             <p:ph type="title"/>
           </p:nvPr>
         </p:nvSpPr>
-        <p:spPr/>
+        <p:spPr>
+          <a:xfrm>
+            <a:off x="417095" y="365125"/>
+            <a:ext cx="10936705" cy="1325563"/>
+          </a:xfrm>
+        </p:spPr>
         <p:txBody>
           <a:bodyPr/>
           <a:lstStyle/>
           <a:p>
             <a:r>
               <a:rPr lang="en-US" dirty="0"/>
-              <a:t>Review of what we have covered</a:t>
+              <a:t>Advanced topic: Globus Shared Endpoints</a:t>
             </a:r>
           </a:p>
         </p:txBody>
@@ -6624,7 +6696,7 @@
           <p:cNvPr id="3" name="Content Placeholder 2">
             <a:extLst>
               <a:ext uri="{FF2B5EF4-FFF2-40B4-BE49-F238E27FC236}">
-                <a16:creationId xmlns:a16="http://schemas.microsoft.com/office/drawing/2014/main" id="{2894144B-C67C-3C4C-B875-C74D09C2EC93}"/>
+                <a16:creationId xmlns:a16="http://schemas.microsoft.com/office/drawing/2014/main" id="{E437D284-E949-488F-AEA2-34685743F886}"/>
               </a:ext>
             </a:extLst>
           </p:cNvPr>
@@ -6638,7 +6710,7 @@
         <p:spPr/>
         <p:txBody>
           <a:bodyPr vert="horz" lIns="91440" tIns="45720" rIns="91440" bIns="45720" rtlCol="0" anchor="t">
-            <a:normAutofit/>
+            <a:normAutofit fontScale="92500"/>
           </a:bodyPr>
           <a:lstStyle/>
           <a:p>
@@ -6647,7 +6719,7 @@
                 <a:latin typeface="Helvetica"/>
                 <a:cs typeface="Helvetica"/>
               </a:rPr>
-              <a:t>Ways to access your data </a:t>
+              <a:t>Globus offers ‘shared endpoints’, which allow you to share your data with external collaborators (i.e. you can share data with people who don't have CURC accounts)</a:t>
             </a:r>
           </a:p>
           <a:p>
@@ -6656,42 +6728,71 @@
                 <a:latin typeface="Helvetica"/>
                 <a:cs typeface="Helvetica"/>
               </a:rPr>
-              <a:t>Filesystem structure of CURC resources</a:t>
-            </a:r>
-          </a:p>
-          <a:p>
-            <a:r>
-              <a:rPr lang="en-US" dirty="0">
+              <a:t>CURC provides this capability, however, it is only available for </a:t>
+            </a:r>
+            <a:r>
+              <a:rPr lang="en-US" u="sng" dirty="0" err="1">
                 <a:latin typeface="Helvetica"/>
                 <a:cs typeface="Helvetica"/>
               </a:rPr>
-              <a:t>Data transfer using </a:t>
-            </a:r>
+              <a:t>PetaLibrary</a:t>
+            </a:r>
+            <a:r>
+              <a:rPr lang="en-US" u="sng" dirty="0">
+                <a:latin typeface="Helvetica"/>
+                <a:cs typeface="Helvetica"/>
+              </a:rPr>
+              <a:t> customers</a:t>
+            </a:r>
+          </a:p>
+          <a:p>
             <a:r>
               <a:rPr lang="en-US" dirty="0"/>
-              <a:t>Globus </a:t>
+              <a:t>Shared Endpoints generate a shared collection that can be accessed with a link</a:t>
             </a:r>
           </a:p>
           <a:p>
             <a:pPr lvl="1"/>
             <a:r>
               <a:rPr lang="en-US" dirty="0"/>
-              <a:t>Web-based interface</a:t>
-            </a:r>
+              <a:t>For an example, see </a:t>
+            </a:r>
+            <a:r>
+              <a:rPr lang="en-US" b="0" i="0" u="none" strike="noStrike" dirty="0">
+                <a:effectLst/>
+                <a:latin typeface="Slack-Lato"/>
+                <a:hlinkClick r:id="rId2"/>
+              </a:rPr>
+              <a:t>https://scholar.colorado.edu/concern/datasets/9593tw13k</a:t>
+            </a:r>
+            <a:endParaRPr lang="en-US" dirty="0"/>
           </a:p>
           <a:p>
             <a:pPr lvl="1"/>
             <a:r>
               <a:rPr lang="en-US" dirty="0"/>
-              <a:t>Local Globus endpoint</a:t>
+              <a:t>You can assign various permissions to specific users or all users within Globus</a:t>
             </a:r>
           </a:p>
           <a:p>
             <a:pPr lvl="1"/>
             <a:r>
               <a:rPr lang="en-US" dirty="0"/>
-              <a:t>Connecting local and CURC endpoints</a:t>
-            </a:r>
+              <a:t>More information is provided at </a:t>
+            </a:r>
+            <a:r>
+              <a:rPr lang="en-US" dirty="0">
+                <a:hlinkClick r:id="rId3"/>
+              </a:rPr>
+              <a:t>https://docs.globus.org/how-to/share-files/</a:t>
+            </a:r>
+            <a:endParaRPr lang="en-US" dirty="0"/>
+          </a:p>
+          <a:p>
+            <a:pPr marL="0" indent="0">
+              <a:buNone/>
+            </a:pPr>
+            <a:endParaRPr lang="en-US" dirty="0"/>
           </a:p>
         </p:txBody>
       </p:sp>
@@ -6700,7 +6801,7 @@
           <p:cNvPr id="4" name="Date Placeholder 3">
             <a:extLst>
               <a:ext uri="{FF2B5EF4-FFF2-40B4-BE49-F238E27FC236}">
-                <a16:creationId xmlns:a16="http://schemas.microsoft.com/office/drawing/2014/main" id="{1970CF65-CADC-1B45-85DF-87C6E06B3380}"/>
+                <a16:creationId xmlns:a16="http://schemas.microsoft.com/office/drawing/2014/main" id="{3BF07BAE-E9F1-45A4-BA07-2610004AF5E3}"/>
               </a:ext>
             </a:extLst>
           </p:cNvPr>
@@ -6717,10 +6818,9 @@
           <a:lstStyle/>
           <a:p>
             <a:r>
-              <a:rPr lang="en-US"/>
-              <a:t>Data Transfer - 8/13/2024</a:t>
-            </a:r>
-            <a:endParaRPr lang="en-US" dirty="0"/>
+              <a:rPr lang="en-US" dirty="0"/>
+              <a:t>Data Transfer - 1/8/2025</a:t>
+            </a:r>
           </a:p>
         </p:txBody>
       </p:sp>
@@ -6729,7 +6829,7 @@
           <p:cNvPr id="7" name="Slide Number Placeholder 6">
             <a:extLst>
               <a:ext uri="{FF2B5EF4-FFF2-40B4-BE49-F238E27FC236}">
-                <a16:creationId xmlns:a16="http://schemas.microsoft.com/office/drawing/2014/main" id="{AB196DEF-73D7-8659-A5AF-B02403DF623C}"/>
+                <a16:creationId xmlns:a16="http://schemas.microsoft.com/office/drawing/2014/main" id="{DE23A06D-BFE0-FCEE-3B87-B5F9739EA177}"/>
               </a:ext>
             </a:extLst>
           </p:cNvPr>
@@ -6756,7 +6856,7 @@
     </p:spTree>
     <p:extLst>
       <p:ext uri="{BB962C8B-B14F-4D97-AF65-F5344CB8AC3E}">
-        <p14:creationId xmlns:p14="http://schemas.microsoft.com/office/powerpoint/2010/main" val="3295275631"/>
+        <p14:creationId xmlns:p14="http://schemas.microsoft.com/office/powerpoint/2010/main" val="2910004548"/>
       </p:ext>
     </p:extLst>
   </p:cSld>
@@ -6767,6 +6867,225 @@
 </file>
 
 <file path=ppt/slides/slide2.xml><?xml version="1.0" encoding="utf-8"?>
+<p:sld xmlns:a="http://schemas.openxmlformats.org/drawingml/2006/main" xmlns:r="http://schemas.openxmlformats.org/officeDocument/2006/relationships" xmlns:p="http://schemas.openxmlformats.org/presentationml/2006/main">
+  <p:cSld>
+    <p:spTree>
+      <p:nvGrpSpPr>
+        <p:cNvPr id="1" name="">
+          <a:extLst>
+            <a:ext uri="{FF2B5EF4-FFF2-40B4-BE49-F238E27FC236}">
+              <a16:creationId xmlns:a16="http://schemas.microsoft.com/office/drawing/2014/main" id="{C3F6975B-3D8F-4743-3577-E805874B16FA}"/>
+            </a:ext>
+          </a:extLst>
+        </p:cNvPr>
+        <p:cNvGrpSpPr/>
+        <p:nvPr/>
+      </p:nvGrpSpPr>
+      <p:grpSpPr>
+        <a:xfrm>
+          <a:off x="0" y="0"/>
+          <a:ext cx="0" cy="0"/>
+          <a:chOff x="0" y="0"/>
+          <a:chExt cx="0" cy="0"/>
+        </a:xfrm>
+      </p:grpSpPr>
+      <p:sp>
+        <p:nvSpPr>
+          <p:cNvPr id="2" name="Title 1">
+            <a:extLst>
+              <a:ext uri="{FF2B5EF4-FFF2-40B4-BE49-F238E27FC236}">
+                <a16:creationId xmlns:a16="http://schemas.microsoft.com/office/drawing/2014/main" id="{26AFAC29-5C27-72EA-7650-C54EE8EAFD06}"/>
+              </a:ext>
+            </a:extLst>
+          </p:cNvPr>
+          <p:cNvSpPr>
+            <a:spLocks noGrp="1"/>
+          </p:cNvSpPr>
+          <p:nvPr>
+            <p:ph type="ctrTitle"/>
+          </p:nvPr>
+        </p:nvSpPr>
+        <p:spPr>
+          <a:xfrm>
+            <a:off x="906378" y="824953"/>
+            <a:ext cx="10379243" cy="3035299"/>
+          </a:xfrm>
+        </p:spPr>
+        <p:txBody>
+          <a:bodyPr>
+            <a:normAutofit fontScale="90000"/>
+          </a:bodyPr>
+          <a:lstStyle/>
+          <a:p>
+            <a:r>
+              <a:rPr lang="en-US" dirty="0"/>
+              <a:t>Transferring your data to &amp; from CU Boulder Research Computing</a:t>
+            </a:r>
+            <a:br>
+              <a:rPr lang="en-US" dirty="0"/>
+            </a:br>
+            <a:br>
+              <a:rPr lang="en-US" dirty="0">
+                <a:latin typeface="Century Gothic" panose="020B0502020202020204" pitchFamily="34" charset="0"/>
+              </a:rPr>
+            </a:br>
+            <a:endParaRPr lang="en-US" sz="3600" dirty="0">
+              <a:solidFill>
+                <a:schemeClr val="bg2">
+                  <a:lumMod val="25000"/>
+                </a:schemeClr>
+              </a:solidFill>
+              <a:latin typeface="Century Gothic" panose="020B0502020202020204" pitchFamily="34" charset="0"/>
+            </a:endParaRPr>
+          </a:p>
+        </p:txBody>
+      </p:sp>
+      <p:sp>
+        <p:nvSpPr>
+          <p:cNvPr id="4" name="TextBox 3">
+            <a:extLst>
+              <a:ext uri="{FF2B5EF4-FFF2-40B4-BE49-F238E27FC236}">
+                <a16:creationId xmlns:a16="http://schemas.microsoft.com/office/drawing/2014/main" id="{DD1C1442-A16D-AEFA-D54F-F17FBE09F9E0}"/>
+              </a:ext>
+            </a:extLst>
+          </p:cNvPr>
+          <p:cNvSpPr txBox="1"/>
+          <p:nvPr/>
+        </p:nvSpPr>
+        <p:spPr>
+          <a:xfrm>
+            <a:off x="4151586" y="3620100"/>
+            <a:ext cx="3699642" cy="523220"/>
+          </a:xfrm>
+          <a:prstGeom prst="rect">
+            <a:avLst/>
+          </a:prstGeom>
+          <a:noFill/>
+        </p:spPr>
+        <p:txBody>
+          <a:bodyPr wrap="square" rtlCol="0">
+            <a:spAutoFit/>
+          </a:bodyPr>
+          <a:lstStyle/>
+          <a:p>
+            <a:pPr algn="ctr"/>
+            <a:r>
+              <a:rPr lang="en-US" sz="2800" dirty="0">
+                <a:latin typeface="Century Gothic" panose="020B0502020202020204" pitchFamily="34" charset="0"/>
+              </a:rPr>
+              <a:t>January 08, 2025</a:t>
+            </a:r>
+          </a:p>
+        </p:txBody>
+      </p:sp>
+      <p:sp>
+        <p:nvSpPr>
+          <p:cNvPr id="3" name="Subtitle 2">
+            <a:extLst>
+              <a:ext uri="{FF2B5EF4-FFF2-40B4-BE49-F238E27FC236}">
+                <a16:creationId xmlns:a16="http://schemas.microsoft.com/office/drawing/2014/main" id="{7E780717-758C-3C30-453F-FA0B387174BF}"/>
+              </a:ext>
+            </a:extLst>
+          </p:cNvPr>
+          <p:cNvSpPr>
+            <a:spLocks noGrp="1"/>
+          </p:cNvSpPr>
+          <p:nvPr>
+            <p:ph type="subTitle" idx="1"/>
+          </p:nvPr>
+        </p:nvSpPr>
+        <p:spPr>
+          <a:xfrm>
+            <a:off x="2165684" y="4933236"/>
+            <a:ext cx="7972927" cy="857963"/>
+          </a:xfrm>
+        </p:spPr>
+        <p:txBody>
+          <a:bodyPr vert="horz" lIns="91440" tIns="45720" rIns="91440" bIns="45720" rtlCol="0" anchor="t">
+            <a:normAutofit fontScale="77500" lnSpcReduction="20000"/>
+          </a:bodyPr>
+          <a:lstStyle/>
+          <a:p>
+            <a:r>
+              <a:rPr lang="en-US" dirty="0">
+                <a:latin typeface="Century Gothic"/>
+              </a:rPr>
+              <a:t>Mohal Khandelwal</a:t>
+            </a:r>
+          </a:p>
+          <a:p>
+            <a:r>
+              <a:rPr lang="en-US" dirty="0">
+                <a:latin typeface="Century Gothic"/>
+              </a:rPr>
+              <a:t>Contributors: Andrew Monaghan, Brandon Reyes, Layla Freeborn, Michael Schneider, John </a:t>
+            </a:r>
+            <a:r>
+              <a:rPr lang="en-US" dirty="0" err="1">
+                <a:latin typeface="Century Gothic"/>
+              </a:rPr>
+              <a:t>Reiland</a:t>
+            </a:r>
+            <a:endParaRPr lang="en-US" dirty="0">
+              <a:latin typeface="Century Gothic"/>
+            </a:endParaRPr>
+          </a:p>
+          <a:p>
+            <a:endParaRPr lang="en-US" dirty="0">
+              <a:latin typeface="Century Gothic" panose="020B0502020202020204" pitchFamily="34" charset="0"/>
+            </a:endParaRPr>
+          </a:p>
+          <a:p>
+            <a:endParaRPr lang="en-US" dirty="0">
+              <a:latin typeface="Century Gothic" panose="020B0502020202020204" pitchFamily="34" charset="0"/>
+            </a:endParaRPr>
+          </a:p>
+        </p:txBody>
+      </p:sp>
+      <p:pic>
+        <p:nvPicPr>
+          <p:cNvPr id="5" name="Picture 4">
+            <a:extLst>
+              <a:ext uri="{FF2B5EF4-FFF2-40B4-BE49-F238E27FC236}">
+                <a16:creationId xmlns:a16="http://schemas.microsoft.com/office/drawing/2014/main" id="{65ADE10A-B09C-CC68-9BDA-2B15FF1E0CED}"/>
+              </a:ext>
+            </a:extLst>
+          </p:cNvPr>
+          <p:cNvPicPr>
+            <a:picLocks noChangeAspect="1"/>
+          </p:cNvPicPr>
+          <p:nvPr/>
+        </p:nvPicPr>
+        <p:blipFill>
+          <a:blip r:embed="rId3"/>
+          <a:stretch>
+            <a:fillRect/>
+          </a:stretch>
+        </p:blipFill>
+        <p:spPr>
+          <a:xfrm>
+            <a:off x="0" y="-1"/>
+            <a:ext cx="12192000" cy="6858001"/>
+          </a:xfrm>
+          <a:prstGeom prst="rect">
+            <a:avLst/>
+          </a:prstGeom>
+        </p:spPr>
+      </p:pic>
+    </p:spTree>
+    <p:extLst>
+      <p:ext uri="{BB962C8B-B14F-4D97-AF65-F5344CB8AC3E}">
+        <p14:creationId xmlns:p14="http://schemas.microsoft.com/office/powerpoint/2010/main" val="3129053462"/>
+      </p:ext>
+    </p:extLst>
+  </p:cSld>
+  <p:clrMapOvr>
+    <a:masterClrMapping/>
+  </p:clrMapOvr>
+</p:sld>
+</file>
+
+<file path=ppt/slides/slide20.xml><?xml version="1.0" encoding="utf-8"?>
 <p:sld xmlns:a="http://schemas.openxmlformats.org/drawingml/2006/main" xmlns:r="http://schemas.openxmlformats.org/officeDocument/2006/relationships" xmlns:p="http://schemas.openxmlformats.org/presentationml/2006/main">
   <p:cSld>
     <p:spTree>
@@ -6806,7 +7125,7 @@
           <a:p>
             <a:r>
               <a:rPr lang="en-US" dirty="0"/>
-              <a:t>Learning Objectives</a:t>
+              <a:t>Review of what we have covered</a:t>
             </a:r>
           </a:p>
         </p:txBody>
@@ -6857,15 +7176,6 @@
                 <a:latin typeface="Helvetica"/>
                 <a:cs typeface="Helvetica"/>
               </a:rPr>
-              <a:t>Data transfer with OnDemand “Files” application</a:t>
-            </a:r>
-          </a:p>
-          <a:p>
-            <a:r>
-              <a:rPr lang="en-US" dirty="0">
-                <a:latin typeface="Helvetica"/>
-                <a:cs typeface="Helvetica"/>
-              </a:rPr>
               <a:t>Data transfer using </a:t>
             </a:r>
             <a:r>
@@ -6918,10 +7228,9 @@
           <a:lstStyle/>
           <a:p>
             <a:r>
-              <a:rPr lang="en-US"/>
-              <a:t>Data Transfer - 8/13/2024</a:t>
-            </a:r>
-            <a:endParaRPr lang="en-US" dirty="0"/>
+              <a:rPr lang="en-US" dirty="0"/>
+              <a:t>Data Transfer - 1/8/2025</a:t>
+            </a:r>
           </a:p>
         </p:txBody>
       </p:sp>
@@ -6930,7 +7239,7 @@
           <p:cNvPr id="7" name="Slide Number Placeholder 6">
             <a:extLst>
               <a:ext uri="{FF2B5EF4-FFF2-40B4-BE49-F238E27FC236}">
-                <a16:creationId xmlns:a16="http://schemas.microsoft.com/office/drawing/2014/main" id="{039C143E-2185-2D04-04E1-0531FE765A3F}"/>
+                <a16:creationId xmlns:a16="http://schemas.microsoft.com/office/drawing/2014/main" id="{AB196DEF-73D7-8659-A5AF-B02403DF623C}"/>
               </a:ext>
             </a:extLst>
           </p:cNvPr>
@@ -6948,7 +7257,7 @@
           <a:p>
             <a:fld id="{ABDA560F-461C-6043-9BC4-489BA92F7161}" type="slidenum">
               <a:rPr lang="en-US" smtClean="0"/>
-              <a:t>2</a:t>
+              <a:t>20</a:t>
             </a:fld>
             <a:endParaRPr lang="en-US"/>
           </a:p>
@@ -6957,7 +7266,7 @@
     </p:spTree>
     <p:extLst>
       <p:ext uri="{BB962C8B-B14F-4D97-AF65-F5344CB8AC3E}">
-        <p14:creationId xmlns:p14="http://schemas.microsoft.com/office/powerpoint/2010/main" val="1419216743"/>
+        <p14:creationId xmlns:p14="http://schemas.microsoft.com/office/powerpoint/2010/main" val="3295275631"/>
       </p:ext>
     </p:extLst>
   </p:cSld>
@@ -6967,7 +7276,7 @@
 </p:sld>
 </file>
 
-<file path=ppt/slides/slide20.xml><?xml version="1.0" encoding="utf-8"?>
+<file path=ppt/slides/slide21.xml><?xml version="1.0" encoding="utf-8"?>
 <p:sld xmlns:a="http://schemas.openxmlformats.org/drawingml/2006/main" xmlns:r="http://schemas.openxmlformats.org/officeDocument/2006/relationships" xmlns:p="http://schemas.openxmlformats.org/presentationml/2006/main">
   <p:cSld>
     <p:spTree>
@@ -7300,8 +7609,8 @@
           <a:p>
             <a:pPr algn="ctr"/>
             <a:r>
-              <a:rPr lang="en-US"/>
-              <a:t>Data Transfer - 8/13/2024</a:t>
+              <a:rPr lang="en-US" dirty="0"/>
+              <a:t>Data Transfer - 1/8/2025</a:t>
             </a:r>
           </a:p>
         </p:txBody>
@@ -7329,7 +7638,7 @@
           <a:p>
             <a:fld id="{ABDA560F-461C-6043-9BC4-489BA92F7161}" type="slidenum">
               <a:rPr lang="en-US" smtClean="0"/>
-              <a:t>20</a:t>
+              <a:t>21</a:t>
             </a:fld>
             <a:endParaRPr lang="en-US"/>
           </a:p>
@@ -7388,7 +7697,7 @@
           <a:p>
             <a:r>
               <a:rPr lang="en-US" dirty="0"/>
-              <a:t>Acronyms and Terms</a:t>
+              <a:t>Learning Objectives</a:t>
             </a:r>
           </a:p>
         </p:txBody>
@@ -7409,15 +7718,10 @@
             <p:ph idx="1"/>
           </p:nvPr>
         </p:nvSpPr>
-        <p:spPr>
-          <a:xfrm>
-            <a:off x="276726" y="1616744"/>
-            <a:ext cx="11353800" cy="4351338"/>
-          </a:xfrm>
-        </p:spPr>
+        <p:spPr/>
         <p:txBody>
           <a:bodyPr vert="horz" lIns="91440" tIns="45720" rIns="91440" bIns="45720" rtlCol="0" anchor="t">
-            <a:normAutofit fontScale="92500" lnSpcReduction="20000"/>
+            <a:normAutofit/>
           </a:bodyPr>
           <a:lstStyle/>
           <a:p>
@@ -7426,129 +7730,59 @@
                 <a:latin typeface="Helvetica"/>
                 <a:cs typeface="Helvetica"/>
               </a:rPr>
-              <a:t>Acronyms</a:t>
-            </a:r>
-          </a:p>
-          <a:p>
-            <a:pPr lvl="1"/>
+              <a:t>Ways to access your data </a:t>
+            </a:r>
+          </a:p>
+          <a:p>
             <a:r>
               <a:rPr lang="en-US" dirty="0">
                 <a:latin typeface="Helvetica"/>
                 <a:cs typeface="Helvetica"/>
               </a:rPr>
-              <a:t>HPC – “High Performance Computing” (“supercomputing”)</a:t>
-            </a:r>
-          </a:p>
-          <a:p>
-            <a:pPr lvl="1"/>
+              <a:t>Filesystem structure of CURC resources</a:t>
+            </a:r>
+          </a:p>
+          <a:p>
             <a:r>
               <a:rPr lang="en-US" dirty="0">
                 <a:latin typeface="Helvetica"/>
                 <a:cs typeface="Helvetica"/>
               </a:rPr>
-              <a:t>CURC – “CU Boulder Research Computing”</a:t>
-            </a:r>
-          </a:p>
-          <a:p>
-            <a:pPr lvl="1"/>
+              <a:t>Data transfer with OnDemand “Files” application</a:t>
+            </a:r>
+          </a:p>
+          <a:p>
             <a:r>
               <a:rPr lang="en-US" dirty="0">
                 <a:latin typeface="Helvetica"/>
                 <a:cs typeface="Helvetica"/>
               </a:rPr>
-              <a:t>RMACC – “Rocky Mountain Advanced Computing Consortium</a:t>
+              <a:t>Data transfer using </a:t>
+            </a:r>
+            <a:r>
+              <a:rPr lang="en-US" dirty="0"/>
+              <a:t>Globus </a:t>
             </a:r>
           </a:p>
           <a:p>
             <a:pPr lvl="1"/>
             <a:r>
-              <a:rPr lang="en-US" dirty="0">
-                <a:latin typeface="Helvetica"/>
-                <a:cs typeface="Helvetica"/>
-              </a:rPr>
-              <a:t>GUI – “Graphical user interface”</a:t>
-            </a:r>
-          </a:p>
-          <a:p>
-            <a:endParaRPr lang="en-US" dirty="0">
-              <a:latin typeface="Helvetica"/>
-              <a:cs typeface="Helvetica"/>
-            </a:endParaRPr>
-          </a:p>
-          <a:p>
-            <a:r>
-              <a:rPr lang="en-US" dirty="0">
-                <a:latin typeface="Helvetica"/>
-                <a:cs typeface="Helvetica"/>
-              </a:rPr>
-              <a:t>Terms</a:t>
+              <a:rPr lang="en-US" dirty="0"/>
+              <a:t>Web-based interface</a:t>
             </a:r>
           </a:p>
           <a:p>
             <a:pPr lvl="1"/>
             <a:r>
-              <a:rPr lang="en-US" dirty="0">
-                <a:latin typeface="Helvetica"/>
-                <a:cs typeface="Helvetica"/>
-              </a:rPr>
-              <a:t>OnDemand – Browser-based gateway to CURC resources </a:t>
+              <a:rPr lang="en-US" dirty="0"/>
+              <a:t>Local Globus endpoint</a:t>
             </a:r>
           </a:p>
           <a:p>
             <a:pPr lvl="1"/>
             <a:r>
-              <a:rPr lang="en-US" dirty="0">
-                <a:latin typeface="Helvetica"/>
-                <a:cs typeface="Helvetica"/>
-              </a:rPr>
-              <a:t>Globus – Browser based file transfer service</a:t>
-            </a:r>
-          </a:p>
-          <a:p>
-            <a:pPr lvl="1"/>
-            <a:r>
-              <a:rPr lang="en-US" dirty="0">
-                <a:latin typeface="Helvetica"/>
-                <a:cs typeface="Helvetica"/>
-              </a:rPr>
-              <a:t>Endpoint – the source or destination of a specific Globus file transfer (“Collection”)</a:t>
-            </a:r>
-          </a:p>
-          <a:p>
-            <a:pPr lvl="1"/>
-            <a:r>
-              <a:rPr lang="en-US" dirty="0" err="1">
-                <a:latin typeface="Helvetica"/>
-                <a:cs typeface="Helvetica"/>
-              </a:rPr>
-              <a:t>PetaLibrary</a:t>
-            </a:r>
-            <a:r>
-              <a:rPr lang="en-US" dirty="0">
-                <a:latin typeface="Helvetica"/>
-                <a:cs typeface="Helvetica"/>
-              </a:rPr>
-              <a:t> – CU’s file storage service for large data sets</a:t>
-            </a:r>
-          </a:p>
-          <a:p>
-            <a:pPr lvl="1"/>
-            <a:r>
-              <a:rPr lang="en-US" dirty="0">
-                <a:latin typeface="Helvetica"/>
-                <a:cs typeface="Helvetica"/>
-              </a:rPr>
-              <a:t>ACCESS -- National Science Foundation (NSF) supercomputing Program</a:t>
-            </a:r>
-          </a:p>
-          <a:p>
-            <a:pPr lvl="1"/>
-            <a:r>
-              <a:rPr lang="en-US" dirty="0">
-                <a:latin typeface="Helvetica"/>
-                <a:cs typeface="Helvetica"/>
-              </a:rPr>
-              <a:t>XSEDE – Previous NSF supercomputing program</a:t>
+              <a:rPr lang="en-US" dirty="0"/>
+              <a:t>Connecting local and CURC endpoints</a:t>
             </a:r>
           </a:p>
         </p:txBody>
@@ -7575,10 +7809,9 @@
           <a:lstStyle/>
           <a:p>
             <a:r>
-              <a:rPr lang="en-US"/>
-              <a:t>Data Transfer - 8/13/2024</a:t>
-            </a:r>
-            <a:endParaRPr lang="en-US" dirty="0"/>
+              <a:rPr lang="en-US" dirty="0"/>
+              <a:t>Data Transfer – 1/8/2025</a:t>
+            </a:r>
           </a:p>
         </p:txBody>
       </p:sp>
@@ -7587,7 +7820,7 @@
           <p:cNvPr id="7" name="Slide Number Placeholder 6">
             <a:extLst>
               <a:ext uri="{FF2B5EF4-FFF2-40B4-BE49-F238E27FC236}">
-                <a16:creationId xmlns:a16="http://schemas.microsoft.com/office/drawing/2014/main" id="{DB96C904-7B17-15BE-5CFC-C9E7674B586B}"/>
+                <a16:creationId xmlns:a16="http://schemas.microsoft.com/office/drawing/2014/main" id="{039C143E-2185-2D04-04E1-0531FE765A3F}"/>
               </a:ext>
             </a:extLst>
           </p:cNvPr>
@@ -7614,7 +7847,7 @@
     </p:spTree>
     <p:extLst>
       <p:ext uri="{BB962C8B-B14F-4D97-AF65-F5344CB8AC3E}">
-        <p14:creationId xmlns:p14="http://schemas.microsoft.com/office/powerpoint/2010/main" val="1483945757"/>
+        <p14:creationId xmlns:p14="http://schemas.microsoft.com/office/powerpoint/2010/main" val="1419216743"/>
       </p:ext>
     </p:extLst>
   </p:cSld>
@@ -7646,6 +7879,281 @@
           <p:cNvPr id="2" name="Title 1">
             <a:extLst>
               <a:ext uri="{FF2B5EF4-FFF2-40B4-BE49-F238E27FC236}">
+                <a16:creationId xmlns:a16="http://schemas.microsoft.com/office/drawing/2014/main" id="{A421DF4B-7AA2-8B40-8162-39DDF5CC3981}"/>
+              </a:ext>
+            </a:extLst>
+          </p:cNvPr>
+          <p:cNvSpPr>
+            <a:spLocks noGrp="1"/>
+          </p:cNvSpPr>
+          <p:nvPr>
+            <p:ph type="title"/>
+          </p:nvPr>
+        </p:nvSpPr>
+        <p:spPr/>
+        <p:txBody>
+          <a:bodyPr/>
+          <a:lstStyle/>
+          <a:p>
+            <a:r>
+              <a:rPr lang="en-US" dirty="0"/>
+              <a:t>Acronyms and Terms</a:t>
+            </a:r>
+          </a:p>
+        </p:txBody>
+      </p:sp>
+      <p:sp>
+        <p:nvSpPr>
+          <p:cNvPr id="3" name="Content Placeholder 2">
+            <a:extLst>
+              <a:ext uri="{FF2B5EF4-FFF2-40B4-BE49-F238E27FC236}">
+                <a16:creationId xmlns:a16="http://schemas.microsoft.com/office/drawing/2014/main" id="{2894144B-C67C-3C4C-B875-C74D09C2EC93}"/>
+              </a:ext>
+            </a:extLst>
+          </p:cNvPr>
+          <p:cNvSpPr>
+            <a:spLocks noGrp="1"/>
+          </p:cNvSpPr>
+          <p:nvPr>
+            <p:ph idx="1"/>
+          </p:nvPr>
+        </p:nvSpPr>
+        <p:spPr>
+          <a:xfrm>
+            <a:off x="276726" y="1616744"/>
+            <a:ext cx="11353800" cy="4351338"/>
+          </a:xfrm>
+        </p:spPr>
+        <p:txBody>
+          <a:bodyPr vert="horz" lIns="91440" tIns="45720" rIns="91440" bIns="45720" rtlCol="0" anchor="t">
+            <a:normAutofit fontScale="92500" lnSpcReduction="20000"/>
+          </a:bodyPr>
+          <a:lstStyle/>
+          <a:p>
+            <a:r>
+              <a:rPr lang="en-US" dirty="0">
+                <a:latin typeface="Helvetica"/>
+                <a:cs typeface="Helvetica"/>
+              </a:rPr>
+              <a:t>Acronyms</a:t>
+            </a:r>
+          </a:p>
+          <a:p>
+            <a:pPr lvl="1"/>
+            <a:r>
+              <a:rPr lang="en-US" dirty="0">
+                <a:latin typeface="Helvetica"/>
+                <a:cs typeface="Helvetica"/>
+              </a:rPr>
+              <a:t>HPC – “High Performance Computing” (“supercomputing”)</a:t>
+            </a:r>
+          </a:p>
+          <a:p>
+            <a:pPr lvl="1"/>
+            <a:r>
+              <a:rPr lang="en-US" dirty="0">
+                <a:latin typeface="Helvetica"/>
+                <a:cs typeface="Helvetica"/>
+              </a:rPr>
+              <a:t>CURC – “CU Boulder Research Computing”</a:t>
+            </a:r>
+          </a:p>
+          <a:p>
+            <a:pPr lvl="1"/>
+            <a:r>
+              <a:rPr lang="en-US" dirty="0">
+                <a:latin typeface="Helvetica"/>
+                <a:cs typeface="Helvetica"/>
+              </a:rPr>
+              <a:t>RMACC – “Rocky Mountain Advanced Computing Consortium</a:t>
+            </a:r>
+          </a:p>
+          <a:p>
+            <a:pPr lvl="1"/>
+            <a:r>
+              <a:rPr lang="en-US" dirty="0">
+                <a:latin typeface="Helvetica"/>
+                <a:cs typeface="Helvetica"/>
+              </a:rPr>
+              <a:t>GUI – “Graphical user interface”</a:t>
+            </a:r>
+          </a:p>
+          <a:p>
+            <a:endParaRPr lang="en-US" dirty="0">
+              <a:latin typeface="Helvetica"/>
+              <a:cs typeface="Helvetica"/>
+            </a:endParaRPr>
+          </a:p>
+          <a:p>
+            <a:r>
+              <a:rPr lang="en-US" dirty="0">
+                <a:latin typeface="Helvetica"/>
+                <a:cs typeface="Helvetica"/>
+              </a:rPr>
+              <a:t>Terms</a:t>
+            </a:r>
+          </a:p>
+          <a:p>
+            <a:pPr lvl="1"/>
+            <a:r>
+              <a:rPr lang="en-US" dirty="0">
+                <a:latin typeface="Helvetica"/>
+                <a:cs typeface="Helvetica"/>
+              </a:rPr>
+              <a:t>OnDemand – Browser-based gateway to CURC resources </a:t>
+            </a:r>
+          </a:p>
+          <a:p>
+            <a:pPr lvl="1"/>
+            <a:r>
+              <a:rPr lang="en-US" dirty="0">
+                <a:latin typeface="Helvetica"/>
+                <a:cs typeface="Helvetica"/>
+              </a:rPr>
+              <a:t>Globus – Browser based file transfer service</a:t>
+            </a:r>
+          </a:p>
+          <a:p>
+            <a:pPr lvl="1"/>
+            <a:r>
+              <a:rPr lang="en-US" dirty="0">
+                <a:latin typeface="Helvetica"/>
+                <a:cs typeface="Helvetica"/>
+              </a:rPr>
+              <a:t>Endpoint – the source or destination of a specific Globus file transfer (“Collection”)</a:t>
+            </a:r>
+          </a:p>
+          <a:p>
+            <a:pPr lvl="1"/>
+            <a:r>
+              <a:rPr lang="en-US" dirty="0" err="1">
+                <a:latin typeface="Helvetica"/>
+                <a:cs typeface="Helvetica"/>
+              </a:rPr>
+              <a:t>PetaLibrary</a:t>
+            </a:r>
+            <a:r>
+              <a:rPr lang="en-US" dirty="0">
+                <a:latin typeface="Helvetica"/>
+                <a:cs typeface="Helvetica"/>
+              </a:rPr>
+              <a:t> – CU’s file storage service for large data sets</a:t>
+            </a:r>
+          </a:p>
+          <a:p>
+            <a:pPr lvl="1"/>
+            <a:r>
+              <a:rPr lang="en-US" dirty="0">
+                <a:latin typeface="Helvetica"/>
+                <a:cs typeface="Helvetica"/>
+              </a:rPr>
+              <a:t>ACCESS -- National Science Foundation (NSF) supercomputing Program</a:t>
+            </a:r>
+          </a:p>
+          <a:p>
+            <a:pPr lvl="1"/>
+            <a:r>
+              <a:rPr lang="en-US" dirty="0">
+                <a:latin typeface="Helvetica"/>
+                <a:cs typeface="Helvetica"/>
+              </a:rPr>
+              <a:t>XSEDE – Previous NSF supercomputing program</a:t>
+            </a:r>
+          </a:p>
+        </p:txBody>
+      </p:sp>
+      <p:sp>
+        <p:nvSpPr>
+          <p:cNvPr id="4" name="Date Placeholder 3">
+            <a:extLst>
+              <a:ext uri="{FF2B5EF4-FFF2-40B4-BE49-F238E27FC236}">
+                <a16:creationId xmlns:a16="http://schemas.microsoft.com/office/drawing/2014/main" id="{1970CF65-CADC-1B45-85DF-87C6E06B3380}"/>
+              </a:ext>
+            </a:extLst>
+          </p:cNvPr>
+          <p:cNvSpPr>
+            <a:spLocks noGrp="1"/>
+          </p:cNvSpPr>
+          <p:nvPr>
+            <p:ph type="dt" sz="half" idx="10"/>
+          </p:nvPr>
+        </p:nvSpPr>
+        <p:spPr/>
+        <p:txBody>
+          <a:bodyPr/>
+          <a:lstStyle/>
+          <a:p>
+            <a:r>
+              <a:rPr lang="en-US" dirty="0"/>
+              <a:t>Data Transfer - 1/8/2025</a:t>
+            </a:r>
+          </a:p>
+        </p:txBody>
+      </p:sp>
+      <p:sp>
+        <p:nvSpPr>
+          <p:cNvPr id="7" name="Slide Number Placeholder 6">
+            <a:extLst>
+              <a:ext uri="{FF2B5EF4-FFF2-40B4-BE49-F238E27FC236}">
+                <a16:creationId xmlns:a16="http://schemas.microsoft.com/office/drawing/2014/main" id="{DB96C904-7B17-15BE-5CFC-C9E7674B586B}"/>
+              </a:ext>
+            </a:extLst>
+          </p:cNvPr>
+          <p:cNvSpPr>
+            <a:spLocks noGrp="1"/>
+          </p:cNvSpPr>
+          <p:nvPr>
+            <p:ph type="sldNum" sz="quarter" idx="12"/>
+          </p:nvPr>
+        </p:nvSpPr>
+        <p:spPr/>
+        <p:txBody>
+          <a:bodyPr/>
+          <a:lstStyle/>
+          <a:p>
+            <a:fld id="{ABDA560F-461C-6043-9BC4-489BA92F7161}" type="slidenum">
+              <a:rPr lang="en-US" smtClean="0"/>
+              <a:t>4</a:t>
+            </a:fld>
+            <a:endParaRPr lang="en-US"/>
+          </a:p>
+        </p:txBody>
+      </p:sp>
+    </p:spTree>
+    <p:extLst>
+      <p:ext uri="{BB962C8B-B14F-4D97-AF65-F5344CB8AC3E}">
+        <p14:creationId xmlns:p14="http://schemas.microsoft.com/office/powerpoint/2010/main" val="1483945757"/>
+      </p:ext>
+    </p:extLst>
+  </p:cSld>
+  <p:clrMapOvr>
+    <a:masterClrMapping/>
+  </p:clrMapOvr>
+</p:sld>
+</file>
+
+<file path=ppt/slides/slide5.xml><?xml version="1.0" encoding="utf-8"?>
+<p:sld xmlns:a="http://schemas.openxmlformats.org/drawingml/2006/main" xmlns:r="http://schemas.openxmlformats.org/officeDocument/2006/relationships" xmlns:p="http://schemas.openxmlformats.org/presentationml/2006/main">
+  <p:cSld>
+    <p:spTree>
+      <p:nvGrpSpPr>
+        <p:cNvPr id="1" name=""/>
+        <p:cNvGrpSpPr/>
+        <p:nvPr/>
+      </p:nvGrpSpPr>
+      <p:grpSpPr>
+        <a:xfrm>
+          <a:off x="0" y="0"/>
+          <a:ext cx="0" cy="0"/>
+          <a:chOff x="0" y="0"/>
+          <a:chExt cx="0" cy="0"/>
+        </a:xfrm>
+      </p:grpSpPr>
+      <p:sp>
+        <p:nvSpPr>
+          <p:cNvPr id="2" name="Title 1">
+            <a:extLst>
+              <a:ext uri="{FF2B5EF4-FFF2-40B4-BE49-F238E27FC236}">
                 <a16:creationId xmlns:a16="http://schemas.microsoft.com/office/drawing/2014/main" id="{DC6F84C5-1179-4A50-B25E-2BB815B1FC63}"/>
               </a:ext>
             </a:extLst>
@@ -7784,10 +8292,9 @@
           <a:lstStyle/>
           <a:p>
             <a:r>
-              <a:rPr lang="en-US"/>
-              <a:t>Data Transfer - 8/13/2024</a:t>
-            </a:r>
-            <a:endParaRPr lang="en-US" dirty="0"/>
+              <a:rPr lang="en-US" dirty="0"/>
+              <a:t>Data Transfer - 1/8/2025</a:t>
+            </a:r>
           </a:p>
         </p:txBody>
       </p:sp>
@@ -7814,7 +8321,7 @@
           <a:p>
             <a:fld id="{ABDA560F-461C-6043-9BC4-489BA92F7161}" type="slidenum">
               <a:rPr lang="en-US" smtClean="0"/>
-              <a:t>4</a:t>
+              <a:t>5</a:t>
             </a:fld>
             <a:endParaRPr lang="en-US"/>
           </a:p>
@@ -7833,7 +8340,7 @@
 </p:sld>
 </file>
 
-<file path=ppt/slides/slide5.xml><?xml version="1.0" encoding="utf-8"?>
+<file path=ppt/slides/slide6.xml><?xml version="1.0" encoding="utf-8"?>
 <p:sld xmlns:a="http://schemas.openxmlformats.org/drawingml/2006/main" xmlns:r="http://schemas.openxmlformats.org/officeDocument/2006/relationships" xmlns:p="http://schemas.openxmlformats.org/presentationml/2006/main">
   <p:cSld>
     <p:spTree>
@@ -9000,10 +9507,9 @@
           <a:lstStyle/>
           <a:p>
             <a:r>
-              <a:rPr lang="en-US"/>
-              <a:t>Data Transfer - 8/13/2024</a:t>
-            </a:r>
-            <a:endParaRPr lang="en-US" dirty="0"/>
+              <a:rPr lang="en-US" dirty="0"/>
+              <a:t>Data Transfer - 1/8/2025</a:t>
+            </a:r>
           </a:p>
         </p:txBody>
       </p:sp>
@@ -9030,7 +9536,7 @@
           <a:p>
             <a:fld id="{ABDA560F-461C-6043-9BC4-489BA92F7161}" type="slidenum">
               <a:rPr lang="en-US" smtClean="0"/>
-              <a:t>5</a:t>
+              <a:t>6</a:t>
             </a:fld>
             <a:endParaRPr lang="en-US"/>
           </a:p>
@@ -9173,7 +9679,7 @@
 </p:sld>
 </file>
 
-<file path=ppt/slides/slide6.xml><?xml version="1.0" encoding="utf-8"?>
+<file path=ppt/slides/slide7.xml><?xml version="1.0" encoding="utf-8"?>
 <p:sld xmlns:a="http://schemas.openxmlformats.org/drawingml/2006/main" xmlns:r="http://schemas.openxmlformats.org/officeDocument/2006/relationships" xmlns:p="http://schemas.openxmlformats.org/presentationml/2006/main">
   <p:cSld>
     <p:spTree>
@@ -9364,10 +9870,9 @@
           <a:lstStyle/>
           <a:p>
             <a:r>
-              <a:rPr lang="en-US"/>
-              <a:t>Data Transfer - 8/13/2024</a:t>
-            </a:r>
-            <a:endParaRPr lang="en-US" dirty="0"/>
+              <a:rPr lang="en-US" dirty="0"/>
+              <a:t>Data Transfer - 1/8/2025</a:t>
+            </a:r>
           </a:p>
         </p:txBody>
       </p:sp>
@@ -9394,7 +9899,7 @@
           <a:p>
             <a:fld id="{DD321DBF-325B-3546-BAAF-4F6E3B3181FF}" type="slidenum">
               <a:rPr lang="en-US" smtClean="0"/>
-              <a:t>6</a:t>
+              <a:t>7</a:t>
             </a:fld>
             <a:endParaRPr lang="en-US"/>
           </a:p>
@@ -9413,7 +9918,7 @@
 </p:sld>
 </file>
 
-<file path=ppt/slides/slide7.xml><?xml version="1.0" encoding="utf-8"?>
+<file path=ppt/slides/slide8.xml><?xml version="1.0" encoding="utf-8"?>
 <p:sld xmlns:a="http://schemas.openxmlformats.org/drawingml/2006/main" xmlns:r="http://schemas.openxmlformats.org/officeDocument/2006/relationships" xmlns:p="http://schemas.openxmlformats.org/presentationml/2006/main">
   <p:cSld>
     <p:spTree>
@@ -9585,10 +10090,9 @@
           <a:lstStyle/>
           <a:p>
             <a:r>
-              <a:rPr lang="en-US"/>
-              <a:t>Data Transfer - 8/13/2024</a:t>
-            </a:r>
-            <a:endParaRPr lang="en-US" dirty="0"/>
+              <a:rPr lang="en-US" dirty="0"/>
+              <a:t>Data Transfer - 1/8/2025</a:t>
+            </a:r>
           </a:p>
         </p:txBody>
       </p:sp>
@@ -9615,7 +10119,7 @@
           <a:p>
             <a:fld id="{DD321DBF-325B-3546-BAAF-4F6E3B3181FF}" type="slidenum">
               <a:rPr lang="en-US" smtClean="0"/>
-              <a:t>7</a:t>
+              <a:t>8</a:t>
             </a:fld>
             <a:endParaRPr lang="en-US"/>
           </a:p>
@@ -9625,264 +10129,6 @@
     <p:extLst>
       <p:ext uri="{BB962C8B-B14F-4D97-AF65-F5344CB8AC3E}">
         <p14:creationId xmlns:p14="http://schemas.microsoft.com/office/powerpoint/2010/main" val="3229924252"/>
-      </p:ext>
-    </p:extLst>
-  </p:cSld>
-  <p:clrMapOvr>
-    <a:masterClrMapping/>
-  </p:clrMapOvr>
-</p:sld>
-</file>
-
-<file path=ppt/slides/slide8.xml><?xml version="1.0" encoding="utf-8"?>
-<p:sld xmlns:a="http://schemas.openxmlformats.org/drawingml/2006/main" xmlns:r="http://schemas.openxmlformats.org/officeDocument/2006/relationships" xmlns:p="http://schemas.openxmlformats.org/presentationml/2006/main">
-  <p:cSld>
-    <p:spTree>
-      <p:nvGrpSpPr>
-        <p:cNvPr id="1" name=""/>
-        <p:cNvGrpSpPr/>
-        <p:nvPr/>
-      </p:nvGrpSpPr>
-      <p:grpSpPr>
-        <a:xfrm>
-          <a:off x="0" y="0"/>
-          <a:ext cx="0" cy="0"/>
-          <a:chOff x="0" y="0"/>
-          <a:chExt cx="0" cy="0"/>
-        </a:xfrm>
-      </p:grpSpPr>
-      <p:sp>
-        <p:nvSpPr>
-          <p:cNvPr id="2" name="Title 1">
-            <a:extLst>
-              <a:ext uri="{FF2B5EF4-FFF2-40B4-BE49-F238E27FC236}">
-                <a16:creationId xmlns:a16="http://schemas.microsoft.com/office/drawing/2014/main" id="{7754F94B-7697-4EF8-9AB1-8C12E132A53D}"/>
-              </a:ext>
-            </a:extLst>
-          </p:cNvPr>
-          <p:cNvSpPr>
-            <a:spLocks noGrp="1"/>
-          </p:cNvSpPr>
-          <p:nvPr>
-            <p:ph type="title"/>
-          </p:nvPr>
-        </p:nvSpPr>
-        <p:spPr/>
-        <p:txBody>
-          <a:bodyPr/>
-          <a:lstStyle/>
-          <a:p>
-            <a:r>
-              <a:rPr lang="en-US" dirty="0"/>
-              <a:t>GUI option - Globus</a:t>
-            </a:r>
-          </a:p>
-        </p:txBody>
-      </p:sp>
-      <p:sp>
-        <p:nvSpPr>
-          <p:cNvPr id="3" name="Content Placeholder 2">
-            <a:extLst>
-              <a:ext uri="{FF2B5EF4-FFF2-40B4-BE49-F238E27FC236}">
-                <a16:creationId xmlns:a16="http://schemas.microsoft.com/office/drawing/2014/main" id="{D91603FE-E471-44DA-BC33-ABE088257A56}"/>
-              </a:ext>
-            </a:extLst>
-          </p:cNvPr>
-          <p:cNvSpPr>
-            <a:spLocks noGrp="1"/>
-          </p:cNvSpPr>
-          <p:nvPr>
-            <p:ph idx="1"/>
-          </p:nvPr>
-        </p:nvSpPr>
-        <p:spPr>
-          <a:xfrm>
-            <a:off x="838200" y="1524835"/>
-            <a:ext cx="10515600" cy="4430797"/>
-          </a:xfrm>
-        </p:spPr>
-        <p:txBody>
-          <a:bodyPr vert="horz" lIns="91440" tIns="45720" rIns="91440" bIns="45720" rtlCol="0" anchor="t">
-            <a:normAutofit/>
-          </a:bodyPr>
-          <a:lstStyle/>
-          <a:p>
-            <a:pPr marL="0" indent="0">
-              <a:buNone/>
-            </a:pPr>
-            <a:r>
-              <a:rPr lang="en-US" dirty="0">
-                <a:latin typeface="Helvetica"/>
-                <a:cs typeface="Helvetica"/>
-              </a:rPr>
-              <a:t>Globus is a service that allows for users to reliably move, share, and discover data</a:t>
-            </a:r>
-          </a:p>
-          <a:p>
-            <a:r>
-              <a:rPr lang="en-US" dirty="0">
-                <a:latin typeface="Helvetica"/>
-                <a:cs typeface="Helvetica"/>
-              </a:rPr>
-              <a:t>Command line version is also available </a:t>
-            </a:r>
-          </a:p>
-          <a:p>
-            <a:r>
-              <a:rPr lang="en-US" dirty="0">
-                <a:latin typeface="Helvetica"/>
-                <a:cs typeface="Helvetica"/>
-              </a:rPr>
-              <a:t>Our recommended way to transfer data </a:t>
-            </a:r>
-            <a:endParaRPr lang="en-US" dirty="0">
-              <a:cs typeface="Helvetica"/>
-            </a:endParaRPr>
-          </a:p>
-          <a:p>
-            <a:pPr lvl="1"/>
-            <a:r>
-              <a:rPr lang="en-US" dirty="0"/>
-              <a:t>Stable and fast data transfers</a:t>
-            </a:r>
-          </a:p>
-          <a:p>
-            <a:pPr lvl="1"/>
-            <a:r>
-              <a:rPr lang="en-US" dirty="0"/>
-              <a:t>Transfers continue if a user disconnects</a:t>
-            </a:r>
-          </a:p>
-          <a:p>
-            <a:pPr lvl="1"/>
-            <a:r>
-              <a:rPr lang="en-US" dirty="0">
-                <a:latin typeface="Helvetica"/>
-                <a:cs typeface="Helvetica"/>
-              </a:rPr>
-              <a:t>Web GUI or Globus Connect Personal GUI</a:t>
-            </a:r>
-          </a:p>
-          <a:p>
-            <a:r>
-              <a:rPr lang="en-US" dirty="0">
-                <a:latin typeface="Helvetica"/>
-                <a:cs typeface="Helvetica"/>
-              </a:rPr>
-              <a:t>Supported on all major operating systems</a:t>
-            </a:r>
-          </a:p>
-          <a:p>
-            <a:pPr lvl="1"/>
-            <a:r>
-              <a:rPr lang="en-US" dirty="0">
-                <a:latin typeface="Helvetica"/>
-                <a:cs typeface="Helvetica"/>
-              </a:rPr>
-              <a:t>Works well with cloud storage providers</a:t>
-            </a:r>
-          </a:p>
-          <a:p>
-            <a:pPr lvl="1"/>
-            <a:endParaRPr lang="en-US" dirty="0">
-              <a:latin typeface="Helvetica"/>
-              <a:cs typeface="Helvetica"/>
-            </a:endParaRPr>
-          </a:p>
-        </p:txBody>
-      </p:sp>
-      <p:pic>
-        <p:nvPicPr>
-          <p:cNvPr id="14" name="Picture 13" descr="Globus logo">
-            <a:extLst>
-              <a:ext uri="{FF2B5EF4-FFF2-40B4-BE49-F238E27FC236}">
-                <a16:creationId xmlns:a16="http://schemas.microsoft.com/office/drawing/2014/main" id="{49B39811-EC40-4EE9-9890-908A598E242A}"/>
-              </a:ext>
-            </a:extLst>
-          </p:cNvPr>
-          <p:cNvPicPr>
-            <a:picLocks noChangeAspect="1"/>
-          </p:cNvPicPr>
-          <p:nvPr/>
-        </p:nvPicPr>
-        <p:blipFill>
-          <a:blip r:embed="rId3"/>
-          <a:stretch>
-            <a:fillRect/>
-          </a:stretch>
-        </p:blipFill>
-        <p:spPr>
-          <a:xfrm>
-            <a:off x="9448800" y="3740233"/>
-            <a:ext cx="1905000" cy="1905000"/>
-          </a:xfrm>
-          <a:prstGeom prst="rect">
-            <a:avLst/>
-          </a:prstGeom>
-        </p:spPr>
-      </p:pic>
-      <p:sp>
-        <p:nvSpPr>
-          <p:cNvPr id="4" name="Date Placeholder 3">
-            <a:extLst>
-              <a:ext uri="{FF2B5EF4-FFF2-40B4-BE49-F238E27FC236}">
-                <a16:creationId xmlns:a16="http://schemas.microsoft.com/office/drawing/2014/main" id="{E40F090B-B9C3-4B28-8BAB-DA4372685BAB}"/>
-              </a:ext>
-            </a:extLst>
-          </p:cNvPr>
-          <p:cNvSpPr>
-            <a:spLocks noGrp="1"/>
-          </p:cNvSpPr>
-          <p:nvPr>
-            <p:ph type="dt" sz="half" idx="10"/>
-          </p:nvPr>
-        </p:nvSpPr>
-        <p:spPr/>
-        <p:txBody>
-          <a:bodyPr/>
-          <a:lstStyle/>
-          <a:p>
-            <a:r>
-              <a:rPr lang="en-US"/>
-              <a:t>Data Transfer - 8/13/2024</a:t>
-            </a:r>
-            <a:endParaRPr lang="en-US" dirty="0"/>
-          </a:p>
-        </p:txBody>
-      </p:sp>
-      <p:sp>
-        <p:nvSpPr>
-          <p:cNvPr id="7" name="Slide Number Placeholder 6">
-            <a:extLst>
-              <a:ext uri="{FF2B5EF4-FFF2-40B4-BE49-F238E27FC236}">
-                <a16:creationId xmlns:a16="http://schemas.microsoft.com/office/drawing/2014/main" id="{6E8E9C63-1050-ECE8-FD94-1A15442096CE}"/>
-              </a:ext>
-            </a:extLst>
-          </p:cNvPr>
-          <p:cNvSpPr>
-            <a:spLocks noGrp="1"/>
-          </p:cNvSpPr>
-          <p:nvPr>
-            <p:ph type="sldNum" sz="quarter" idx="12"/>
-          </p:nvPr>
-        </p:nvSpPr>
-        <p:spPr/>
-        <p:txBody>
-          <a:bodyPr/>
-          <a:lstStyle/>
-          <a:p>
-            <a:fld id="{ABDA560F-461C-6043-9BC4-489BA92F7161}" type="slidenum">
-              <a:rPr lang="en-US" smtClean="0"/>
-              <a:t>8</a:t>
-            </a:fld>
-            <a:endParaRPr lang="en-US"/>
-          </a:p>
-        </p:txBody>
-      </p:sp>
-    </p:spTree>
-    <p:extLst>
-      <p:ext uri="{BB962C8B-B14F-4D97-AF65-F5344CB8AC3E}">
-        <p14:creationId xmlns:p14="http://schemas.microsoft.com/office/powerpoint/2010/main" val="1923516316"/>
       </p:ext>
     </p:extLst>
   </p:cSld>
@@ -9914,7 +10160,7 @@
           <p:cNvPr id="2" name="Title 1">
             <a:extLst>
               <a:ext uri="{FF2B5EF4-FFF2-40B4-BE49-F238E27FC236}">
-                <a16:creationId xmlns:a16="http://schemas.microsoft.com/office/drawing/2014/main" id="{3DEFC202-DADB-4548-8531-414B1195F75D}"/>
+                <a16:creationId xmlns:a16="http://schemas.microsoft.com/office/drawing/2014/main" id="{7754F94B-7697-4EF8-9AB1-8C12E132A53D}"/>
               </a:ext>
             </a:extLst>
           </p:cNvPr>
@@ -9927,14 +10173,12 @@
         </p:nvSpPr>
         <p:spPr/>
         <p:txBody>
-          <a:bodyPr>
-            <a:normAutofit/>
-          </a:bodyPr>
+          <a:bodyPr/>
           <a:lstStyle/>
           <a:p>
             <a:r>
               <a:rPr lang="en-US" dirty="0"/>
-              <a:t>Globus Demo</a:t>
+              <a:t>GUI option - Globus</a:t>
             </a:r>
           </a:p>
         </p:txBody>
@@ -9944,7 +10188,7 @@
           <p:cNvPr id="3" name="Content Placeholder 2">
             <a:extLst>
               <a:ext uri="{FF2B5EF4-FFF2-40B4-BE49-F238E27FC236}">
-                <a16:creationId xmlns:a16="http://schemas.microsoft.com/office/drawing/2014/main" id="{1A1E7F7A-C855-4D2B-97B5-8656E98D3BBE}"/>
+                <a16:creationId xmlns:a16="http://schemas.microsoft.com/office/drawing/2014/main" id="{D91603FE-E471-44DA-BC33-ABE088257A56}"/>
               </a:ext>
             </a:extLst>
           </p:cNvPr>
@@ -9957,8 +10201,8 @@
         </p:nvSpPr>
         <p:spPr>
           <a:xfrm>
-            <a:off x="770282" y="2390169"/>
-            <a:ext cx="10651435" cy="2420372"/>
+            <a:off x="838200" y="1524835"/>
+            <a:ext cx="10515600" cy="4430797"/>
           </a:xfrm>
         </p:spPr>
         <p:txBody>
@@ -9967,45 +10211,126 @@
           </a:bodyPr>
           <a:lstStyle/>
           <a:p>
-            <a:r>
-              <a:rPr lang="en-US" sz="3200" dirty="0"/>
-              <a:t>Logging into the web-based interface for Globus </a:t>
-            </a:r>
-          </a:p>
-          <a:p>
-            <a:pPr lvl="1"/>
-            <a:r>
-              <a:rPr lang="en-US" sz="2400" dirty="0"/>
-              <a:t>Provides a nice GUI for managing files on CURC resources</a:t>
-            </a:r>
-          </a:p>
-          <a:p>
-            <a:pPr marL="457200" lvl="1" indent="0">
+            <a:pPr marL="0" indent="0">
               <a:buNone/>
             </a:pPr>
-            <a:endParaRPr lang="en-US" sz="2400" dirty="0"/>
-          </a:p>
-          <a:p>
-            <a:r>
-              <a:rPr lang="en-US" sz="3200" dirty="0"/>
-              <a:t>Installing a Globus Endpoint on your local machine</a:t>
-            </a:r>
+            <a:r>
+              <a:rPr lang="en-US" dirty="0">
+                <a:latin typeface="Helvetica"/>
+                <a:cs typeface="Helvetica"/>
+              </a:rPr>
+              <a:t>Globus is a service that allows for users to reliably move, share, and discover data</a:t>
+            </a:r>
+          </a:p>
+          <a:p>
+            <a:r>
+              <a:rPr lang="en-US" dirty="0">
+                <a:latin typeface="Helvetica"/>
+                <a:cs typeface="Helvetica"/>
+              </a:rPr>
+              <a:t>Command line version is also available </a:t>
+            </a:r>
+          </a:p>
+          <a:p>
+            <a:r>
+              <a:rPr lang="en-US" dirty="0">
+                <a:latin typeface="Helvetica"/>
+                <a:cs typeface="Helvetica"/>
+              </a:rPr>
+              <a:t>Our recommended way to transfer data </a:t>
+            </a:r>
+            <a:endParaRPr lang="en-US" dirty="0">
+              <a:cs typeface="Helvetica"/>
+            </a:endParaRPr>
           </a:p>
           <a:p>
             <a:pPr lvl="1"/>
             <a:r>
-              <a:rPr lang="en-US" sz="2400" dirty="0"/>
-              <a:t>Allows you to interact with files on your local machine via Globus</a:t>
-            </a:r>
-          </a:p>
-        </p:txBody>
-      </p:sp>
+              <a:rPr lang="en-US" dirty="0"/>
+              <a:t>Stable and fast data transfers</a:t>
+            </a:r>
+          </a:p>
+          <a:p>
+            <a:pPr lvl="1"/>
+            <a:r>
+              <a:rPr lang="en-US" dirty="0"/>
+              <a:t>Transfers continue if a user disconnects</a:t>
+            </a:r>
+          </a:p>
+          <a:p>
+            <a:pPr lvl="1"/>
+            <a:r>
+              <a:rPr lang="en-US" dirty="0">
+                <a:latin typeface="Helvetica"/>
+                <a:cs typeface="Helvetica"/>
+              </a:rPr>
+              <a:t>Web GUI or Globus Connect Personal GUI</a:t>
+            </a:r>
+          </a:p>
+          <a:p>
+            <a:r>
+              <a:rPr lang="en-US" dirty="0">
+                <a:latin typeface="Helvetica"/>
+                <a:cs typeface="Helvetica"/>
+              </a:rPr>
+              <a:t>Supported on all major operating systems</a:t>
+            </a:r>
+          </a:p>
+          <a:p>
+            <a:pPr lvl="1"/>
+            <a:r>
+              <a:rPr lang="en-US" dirty="0">
+                <a:latin typeface="Helvetica"/>
+                <a:cs typeface="Helvetica"/>
+              </a:rPr>
+              <a:t>Works well with cloud storage providers</a:t>
+            </a:r>
+          </a:p>
+          <a:p>
+            <a:pPr lvl="1"/>
+            <a:endParaRPr lang="en-US" dirty="0">
+              <a:latin typeface="Helvetica"/>
+              <a:cs typeface="Helvetica"/>
+            </a:endParaRPr>
+          </a:p>
+        </p:txBody>
+      </p:sp>
+      <p:pic>
+        <p:nvPicPr>
+          <p:cNvPr id="14" name="Picture 13" descr="Globus logo">
+            <a:extLst>
+              <a:ext uri="{FF2B5EF4-FFF2-40B4-BE49-F238E27FC236}">
+                <a16:creationId xmlns:a16="http://schemas.microsoft.com/office/drawing/2014/main" id="{49B39811-EC40-4EE9-9890-908A598E242A}"/>
+              </a:ext>
+            </a:extLst>
+          </p:cNvPr>
+          <p:cNvPicPr>
+            <a:picLocks noChangeAspect="1"/>
+          </p:cNvPicPr>
+          <p:nvPr/>
+        </p:nvPicPr>
+        <p:blipFill>
+          <a:blip r:embed="rId3"/>
+          <a:stretch>
+            <a:fillRect/>
+          </a:stretch>
+        </p:blipFill>
+        <p:spPr>
+          <a:xfrm>
+            <a:off x="9448800" y="3740233"/>
+            <a:ext cx="1905000" cy="1905000"/>
+          </a:xfrm>
+          <a:prstGeom prst="rect">
+            <a:avLst/>
+          </a:prstGeom>
+        </p:spPr>
+      </p:pic>
       <p:sp>
         <p:nvSpPr>
           <p:cNvPr id="4" name="Date Placeholder 3">
             <a:extLst>
               <a:ext uri="{FF2B5EF4-FFF2-40B4-BE49-F238E27FC236}">
-                <a16:creationId xmlns:a16="http://schemas.microsoft.com/office/drawing/2014/main" id="{0D20F75C-A166-481E-9B0D-991F7F1D05FB}"/>
+                <a16:creationId xmlns:a16="http://schemas.microsoft.com/office/drawing/2014/main" id="{E40F090B-B9C3-4B28-8BAB-DA4372685BAB}"/>
               </a:ext>
             </a:extLst>
           </p:cNvPr>
@@ -10022,10 +10347,9 @@
           <a:lstStyle/>
           <a:p>
             <a:r>
-              <a:rPr lang="en-US"/>
-              <a:t>Data Transfer - 8/13/2024</a:t>
-            </a:r>
-            <a:endParaRPr lang="en-US" dirty="0"/>
+              <a:rPr lang="en-US" dirty="0"/>
+              <a:t>Data Transfer - 1/8/2025</a:t>
+            </a:r>
           </a:p>
         </p:txBody>
       </p:sp>
@@ -10034,7 +10358,7 @@
           <p:cNvPr id="7" name="Slide Number Placeholder 6">
             <a:extLst>
               <a:ext uri="{FF2B5EF4-FFF2-40B4-BE49-F238E27FC236}">
-                <a16:creationId xmlns:a16="http://schemas.microsoft.com/office/drawing/2014/main" id="{8AA57D2C-F16D-957D-6667-7272E6FF004E}"/>
+                <a16:creationId xmlns:a16="http://schemas.microsoft.com/office/drawing/2014/main" id="{6E8E9C63-1050-ECE8-FD94-1A15442096CE}"/>
               </a:ext>
             </a:extLst>
           </p:cNvPr>
@@ -10061,7 +10385,7 @@
     </p:spTree>
     <p:extLst>
       <p:ext uri="{BB962C8B-B14F-4D97-AF65-F5344CB8AC3E}">
-        <p14:creationId xmlns:p14="http://schemas.microsoft.com/office/powerpoint/2010/main" val="1986419145"/>
+        <p14:creationId xmlns:p14="http://schemas.microsoft.com/office/powerpoint/2010/main" val="1923516316"/>
       </p:ext>
     </p:extLst>
   </p:cSld>
@@ -10628,6 +10952,17 @@
 </file>
 
 <file path=customXml/item1.xml><?xml version="1.0" encoding="utf-8"?>
+<p:properties xmlns:p="http://schemas.microsoft.com/office/2006/metadata/properties" xmlns:xsi="http://www.w3.org/2001/XMLSchema-instance" xmlns:pc="http://schemas.microsoft.com/office/infopath/2007/PartnerControls">
+  <documentManagement>
+    <TaxCatchAll xmlns="92c16b9d-8c83-445e-a4f4-1fe3d2f43f13" xsi:nil="true"/>
+    <lcf76f155ced4ddcb4097134ff3c332f xmlns="7e49f7d3-8802-46ca-9604-495ce27f67f4">
+      <Terms xmlns="http://schemas.microsoft.com/office/infopath/2007/PartnerControls"/>
+    </lcf76f155ced4ddcb4097134ff3c332f>
+  </documentManagement>
+</p:properties>
+</file>
+
+<file path=customXml/item2.xml><?xml version="1.0" encoding="utf-8"?>
 <ct:contentTypeSchema xmlns:ct="http://schemas.microsoft.com/office/2006/metadata/contentType" xmlns:ma="http://schemas.microsoft.com/office/2006/metadata/properties/metaAttributes" ct:_="" ma:_="" ma:contentTypeName="Document" ma:contentTypeID="0x010100DC7320DB280744439FF1CC777D09ECA4" ma:contentTypeVersion="15" ma:contentTypeDescription="Create a new document." ma:contentTypeScope="" ma:versionID="e50b92032c956cc777cf00ac7d475189">
   <xsd:schema xmlns:xsd="http://www.w3.org/2001/XMLSchema" xmlns:xs="http://www.w3.org/2001/XMLSchema" xmlns:p="http://schemas.microsoft.com/office/2006/metadata/properties" xmlns:ns2="7e49f7d3-8802-46ca-9604-495ce27f67f4" xmlns:ns3="a1519f9a-9d6a-41c1-afc9-552e4069f82f" xmlns:ns4="92c16b9d-8c83-445e-a4f4-1fe3d2f43f13" targetNamespace="http://schemas.microsoft.com/office/2006/metadata/properties" ma:root="true" ma:fieldsID="fcd7cab68a23f1df7b42ced4f3edf141" ns2:_="" ns3:_="" ns4:_="">
     <xsd:import namespace="7e49f7d3-8802-46ca-9604-495ce27f67f4"/>
@@ -10869,17 +11204,6 @@
 </ct:contentTypeSchema>
 </file>
 
-<file path=customXml/item2.xml><?xml version="1.0" encoding="utf-8"?>
-<p:properties xmlns:p="http://schemas.microsoft.com/office/2006/metadata/properties" xmlns:xsi="http://www.w3.org/2001/XMLSchema-instance" xmlns:pc="http://schemas.microsoft.com/office/infopath/2007/PartnerControls">
-  <documentManagement>
-    <TaxCatchAll xmlns="92c16b9d-8c83-445e-a4f4-1fe3d2f43f13" xsi:nil="true"/>
-    <lcf76f155ced4ddcb4097134ff3c332f xmlns="7e49f7d3-8802-46ca-9604-495ce27f67f4">
-      <Terms xmlns="http://schemas.microsoft.com/office/infopath/2007/PartnerControls"/>
-    </lcf76f155ced4ddcb4097134ff3c332f>
-  </documentManagement>
-</p:properties>
-</file>
-
 <file path=customXml/item3.xml><?xml version="1.0" encoding="utf-8"?>
 <?mso-contentType ?>
 <FormTemplates xmlns="http://schemas.microsoft.com/sharepoint/v3/contenttype/forms">
@@ -10890,6 +11214,24 @@
 </file>
 
 <file path=customXml/itemProps1.xml><?xml version="1.0" encoding="utf-8"?>
+<ds:datastoreItem xmlns:ds="http://schemas.openxmlformats.org/officeDocument/2006/customXml" ds:itemID="{4AB02FF4-25A1-49FE-9DF7-DD19F525B7FA}">
+  <ds:schemaRefs>
+    <ds:schemaRef ds:uri="7e49f7d3-8802-46ca-9604-495ce27f67f4"/>
+    <ds:schemaRef ds:uri="92c16b9d-8c83-445e-a4f4-1fe3d2f43f13"/>
+    <ds:schemaRef ds:uri="a1519f9a-9d6a-41c1-afc9-552e4069f82f"/>
+    <ds:schemaRef ds:uri="http://purl.org/dc/dcmitype/"/>
+    <ds:schemaRef ds:uri="http://purl.org/dc/elements/1.1/"/>
+    <ds:schemaRef ds:uri="http://purl.org/dc/terms/"/>
+    <ds:schemaRef ds:uri="http://schemas.microsoft.com/office/2006/documentManagement/types"/>
+    <ds:schemaRef ds:uri="http://schemas.microsoft.com/office/2006/metadata/properties"/>
+    <ds:schemaRef ds:uri="http://schemas.microsoft.com/office/infopath/2007/PartnerControls"/>
+    <ds:schemaRef ds:uri="http://schemas.openxmlformats.org/package/2006/metadata/core-properties"/>
+    <ds:schemaRef ds:uri="http://www.w3.org/XML/1998/namespace"/>
+  </ds:schemaRefs>
+</ds:datastoreItem>
+</file>
+
+<file path=customXml/itemProps2.xml><?xml version="1.0" encoding="utf-8"?>
 <ds:datastoreItem xmlns:ds="http://schemas.openxmlformats.org/officeDocument/2006/customXml" ds:itemID="{6BBC22CE-40EC-4545-8FE9-90326628051D}">
   <ds:schemaRefs>
     <ds:schemaRef ds:uri="7e49f7d3-8802-46ca-9604-495ce27f67f4"/>
@@ -10909,24 +11251,6 @@
 </ds:datastoreItem>
 </file>
 
-<file path=customXml/itemProps2.xml><?xml version="1.0" encoding="utf-8"?>
-<ds:datastoreItem xmlns:ds="http://schemas.openxmlformats.org/officeDocument/2006/customXml" ds:itemID="{4AB02FF4-25A1-49FE-9DF7-DD19F525B7FA}">
-  <ds:schemaRefs>
-    <ds:schemaRef ds:uri="7e49f7d3-8802-46ca-9604-495ce27f67f4"/>
-    <ds:schemaRef ds:uri="92c16b9d-8c83-445e-a4f4-1fe3d2f43f13"/>
-    <ds:schemaRef ds:uri="a1519f9a-9d6a-41c1-afc9-552e4069f82f"/>
-    <ds:schemaRef ds:uri="http://purl.org/dc/dcmitype/"/>
-    <ds:schemaRef ds:uri="http://purl.org/dc/elements/1.1/"/>
-    <ds:schemaRef ds:uri="http://purl.org/dc/terms/"/>
-    <ds:schemaRef ds:uri="http://schemas.microsoft.com/office/2006/documentManagement/types"/>
-    <ds:schemaRef ds:uri="http://schemas.microsoft.com/office/2006/metadata/properties"/>
-    <ds:schemaRef ds:uri="http://schemas.microsoft.com/office/infopath/2007/PartnerControls"/>
-    <ds:schemaRef ds:uri="http://schemas.openxmlformats.org/package/2006/metadata/core-properties"/>
-    <ds:schemaRef ds:uri="http://www.w3.org/XML/1998/namespace"/>
-  </ds:schemaRefs>
-</ds:datastoreItem>
-</file>
-
 <file path=customXml/itemProps3.xml><?xml version="1.0" encoding="utf-8"?>
 <ds:datastoreItem xmlns:ds="http://schemas.openxmlformats.org/officeDocument/2006/customXml" ds:itemID="{06B4C708-AA43-4CE7-BE2D-F9D9A02F4940}">
   <ds:schemaRefs>

</xml_diff>

<commit_message>
Updating File_Transfer.pdf and File_Transfer.pptx (#12)
* Updating File_Transfer.pdf and File_Transfer.pptx

c1: Updates made:
 - updated the date
 - added UST slide
 - fixed 2 links for RTD

c2: Updating File_Transfer.pdf and File_Transfer.pptx
 - removed UST slide
</commit_message>
<xml_diff>
--- a/transferring_data/File_transfer.pptx
+++ b/transferring_data/File_transfer.pptx
@@ -216,7 +216,7 @@
           <a:p>
             <a:fld id="{EFDA08D6-E137-3341-A5EE-84219A24203E}" type="datetimeFigureOut">
               <a:rPr lang="en-US" smtClean="0"/>
-              <a:t>8/13/24</a:t>
+              <a:t>1/6/2025</a:t>
             </a:fld>
             <a:endParaRPr lang="en-US"/>
           </a:p>
@@ -527,7 +527,7 @@
           <a:bodyPr/>
           <a:lstStyle/>
           <a:p>
-            <a:endParaRPr lang="en-US"/>
+            <a:endParaRPr lang="en-US" dirty="0"/>
           </a:p>
         </p:txBody>
       </p:sp>
@@ -3279,7 +3279,7 @@
               <a:rPr lang="en-US" sz="2800" dirty="0">
                 <a:latin typeface="Century Gothic" panose="020B0502020202020204" pitchFamily="34" charset="0"/>
               </a:rPr>
-              <a:t>August 13, 2024</a:t>
+              <a:t>January 08, 2025</a:t>
             </a:r>
           </a:p>
         </p:txBody>
@@ -3308,26 +3308,16 @@
         </p:spPr>
         <p:txBody>
           <a:bodyPr vert="horz" lIns="91440" tIns="45720" rIns="91440" bIns="45720" rtlCol="0" anchor="t">
-            <a:normAutofit fontScale="92500"/>
+            <a:normAutofit/>
           </a:bodyPr>
           <a:lstStyle/>
           <a:p>
             <a:r>
-              <a:rPr lang="en-US" dirty="0">
+              <a:rPr lang="en-US">
                 <a:latin typeface="Century Gothic"/>
               </a:rPr>
-              <a:t>Andy Monaghan</a:t>
-            </a:r>
-          </a:p>
-          <a:p>
-            <a:r>
-              <a:rPr lang="en-US" dirty="0">
-                <a:latin typeface="Century Gothic"/>
-              </a:rPr>
-              <a:t>Contributors: Brandon Reyes, Layla Freeborn, Trevor Hall</a:t>
-            </a:r>
-          </a:p>
-          <a:p>
+              <a:t>Mohal Khandelwal</a:t>
+            </a:r>
             <a:endParaRPr lang="en-US" dirty="0">
               <a:latin typeface="Century Gothic" panose="020B0502020202020204" pitchFamily="34" charset="0"/>
             </a:endParaRPr>
@@ -3417,7 +3407,7 @@
         </p:nvSpPr>
         <p:spPr>
           <a:xfrm>
-            <a:off x="838199" y="1825625"/>
+            <a:off x="838199" y="1754375"/>
             <a:ext cx="10651435" cy="4163129"/>
           </a:xfrm>
         </p:spPr>
@@ -3565,10 +3555,9 @@
           <a:lstStyle/>
           <a:p>
             <a:r>
-              <a:rPr lang="en-US"/>
-              <a:t>Data Transfer - 8/13/2024</a:t>
-            </a:r>
-            <a:endParaRPr lang="en-US" dirty="0"/>
+              <a:rPr lang="en-US" dirty="0"/>
+              <a:t>Data Transfer - 1/8/2025</a:t>
+            </a:r>
           </a:p>
         </p:txBody>
       </p:sp>
@@ -3696,10 +3685,9 @@
           <a:lstStyle/>
           <a:p>
             <a:r>
-              <a:rPr lang="en-US"/>
-              <a:t>Data Transfer - 8/13/2024</a:t>
-            </a:r>
-            <a:endParaRPr lang="en-US" dirty="0"/>
+              <a:rPr lang="en-US" dirty="0"/>
+              <a:t>Data Transfer - 1/8/2025</a:t>
+            </a:r>
           </a:p>
         </p:txBody>
       </p:sp>
@@ -3895,10 +3883,9 @@
           <a:lstStyle/>
           <a:p>
             <a:r>
-              <a:rPr lang="en-US"/>
-              <a:t>Data Transfer - 8/13/2024</a:t>
-            </a:r>
-            <a:endParaRPr lang="en-US" dirty="0"/>
+              <a:rPr lang="en-US" dirty="0"/>
+              <a:t>Data Transfer - 1/8/2025</a:t>
+            </a:r>
           </a:p>
         </p:txBody>
       </p:sp>
@@ -4318,10 +4305,9 @@
           <a:lstStyle/>
           <a:p>
             <a:r>
-              <a:rPr lang="en-US"/>
-              <a:t>Data Transfer - 8/13/2024</a:t>
-            </a:r>
-            <a:endParaRPr lang="en-US" dirty="0"/>
+              <a:rPr lang="en-US" dirty="0"/>
+              <a:t>Data Transfer - 1/8/2025</a:t>
+            </a:r>
           </a:p>
         </p:txBody>
       </p:sp>
@@ -4727,10 +4713,9 @@
           <a:lstStyle/>
           <a:p>
             <a:r>
-              <a:rPr lang="en-US"/>
-              <a:t>Data Transfer - 8/13/2024</a:t>
-            </a:r>
-            <a:endParaRPr lang="en-US" dirty="0"/>
+              <a:rPr lang="en-US" dirty="0"/>
+              <a:t>Data Transfer - 1/8/2025</a:t>
+            </a:r>
           </a:p>
         </p:txBody>
       </p:sp>
@@ -4851,10 +4836,9 @@
           <a:lstStyle/>
           <a:p>
             <a:r>
-              <a:rPr lang="en-US"/>
-              <a:t>Data Transfer - 8/13/2024</a:t>
-            </a:r>
-            <a:endParaRPr lang="en-US" dirty="0"/>
+              <a:rPr lang="en-US" dirty="0"/>
+              <a:t>Data Transfer - 1/8/2025</a:t>
+            </a:r>
           </a:p>
         </p:txBody>
       </p:sp>
@@ -5639,10 +5623,9 @@
           <a:lstStyle/>
           <a:p>
             <a:r>
-              <a:rPr lang="en-US"/>
-              <a:t>Data Transfer - 8/13/2024</a:t>
-            </a:r>
-            <a:endParaRPr lang="en-US" dirty="0"/>
+              <a:rPr lang="en-US" dirty="0"/>
+              <a:t>Data Transfer - 1/8/2025</a:t>
+            </a:r>
           </a:p>
         </p:txBody>
       </p:sp>
@@ -6279,12 +6262,16 @@
           <a:lstStyle/>
           <a:p>
             <a:r>
-              <a:rPr lang="en-US">
+              <a:rPr lang="en-US" dirty="0">
                 <a:solidFill>
                   <a:schemeClr val="tx1"/>
                 </a:solidFill>
               </a:rPr>
-              <a:t>Data Transfer - 8/13/2024</a:t>
+              <a:t>Data Transfer - </a:t>
+            </a:r>
+            <a:r>
+              <a:rPr lang="en-US" dirty="0"/>
+              <a:t>1/8/2025</a:t>
             </a:r>
             <a:endParaRPr lang="en-US" dirty="0">
               <a:solidFill>
@@ -6525,10 +6512,9 @@
           <a:lstStyle/>
           <a:p>
             <a:r>
-              <a:rPr lang="en-US"/>
-              <a:t>Data Transfer - 8/13/2024</a:t>
-            </a:r>
-            <a:endParaRPr lang="en-US" dirty="0"/>
+              <a:rPr lang="en-US" dirty="0"/>
+              <a:t>Data Transfer - 1/8/2025</a:t>
+            </a:r>
           </a:p>
         </p:txBody>
       </p:sp>
@@ -6717,10 +6703,9 @@
           <a:lstStyle/>
           <a:p>
             <a:r>
-              <a:rPr lang="en-US"/>
-              <a:t>Data Transfer - 8/13/2024</a:t>
-            </a:r>
-            <a:endParaRPr lang="en-US" dirty="0"/>
+              <a:rPr lang="en-US" dirty="0"/>
+              <a:t>Data Transfer - 1/8/2025</a:t>
+            </a:r>
           </a:p>
         </p:txBody>
       </p:sp>
@@ -6918,10 +6903,9 @@
           <a:lstStyle/>
           <a:p>
             <a:r>
-              <a:rPr lang="en-US"/>
-              <a:t>Data Transfer - 8/13/2024</a:t>
-            </a:r>
-            <a:endParaRPr lang="en-US" dirty="0"/>
+              <a:rPr lang="en-US" dirty="0"/>
+              <a:t>Data Transfer – 1/8/2025</a:t>
+            </a:r>
           </a:p>
         </p:txBody>
       </p:sp>
@@ -7300,8 +7284,8 @@
           <a:p>
             <a:pPr algn="ctr"/>
             <a:r>
-              <a:rPr lang="en-US"/>
-              <a:t>Data Transfer - 8/13/2024</a:t>
+              <a:rPr lang="en-US" dirty="0"/>
+              <a:t>Data Transfer - 1/8/2025</a:t>
             </a:r>
           </a:p>
         </p:txBody>
@@ -7575,10 +7559,9 @@
           <a:lstStyle/>
           <a:p>
             <a:r>
-              <a:rPr lang="en-US"/>
-              <a:t>Data Transfer - 8/13/2024</a:t>
-            </a:r>
-            <a:endParaRPr lang="en-US" dirty="0"/>
+              <a:rPr lang="en-US" dirty="0"/>
+              <a:t>Data Transfer - 1/8/2025</a:t>
+            </a:r>
           </a:p>
         </p:txBody>
       </p:sp>
@@ -7784,10 +7767,9 @@
           <a:lstStyle/>
           <a:p>
             <a:r>
-              <a:rPr lang="en-US"/>
-              <a:t>Data Transfer - 8/13/2024</a:t>
-            </a:r>
-            <a:endParaRPr lang="en-US" dirty="0"/>
+              <a:rPr lang="en-US" dirty="0"/>
+              <a:t>Data Transfer - 1/8/2025</a:t>
+            </a:r>
           </a:p>
         </p:txBody>
       </p:sp>
@@ -9000,10 +8982,9 @@
           <a:lstStyle/>
           <a:p>
             <a:r>
-              <a:rPr lang="en-US"/>
-              <a:t>Data Transfer - 8/13/2024</a:t>
-            </a:r>
-            <a:endParaRPr lang="en-US" dirty="0"/>
+              <a:rPr lang="en-US" dirty="0"/>
+              <a:t>Data Transfer - 1/8/2025</a:t>
+            </a:r>
           </a:p>
         </p:txBody>
       </p:sp>
@@ -9364,10 +9345,9 @@
           <a:lstStyle/>
           <a:p>
             <a:r>
-              <a:rPr lang="en-US"/>
-              <a:t>Data Transfer - 8/13/2024</a:t>
-            </a:r>
-            <a:endParaRPr lang="en-US" dirty="0"/>
+              <a:rPr lang="en-US" dirty="0"/>
+              <a:t>Data Transfer - 1/8/2025</a:t>
+            </a:r>
           </a:p>
         </p:txBody>
       </p:sp>
@@ -9585,10 +9565,9 @@
           <a:lstStyle/>
           <a:p>
             <a:r>
-              <a:rPr lang="en-US"/>
-              <a:t>Data Transfer - 8/13/2024</a:t>
-            </a:r>
-            <a:endParaRPr lang="en-US" dirty="0"/>
+              <a:rPr lang="en-US" dirty="0"/>
+              <a:t>Data Transfer - 1/8/2025</a:t>
+            </a:r>
           </a:p>
         </p:txBody>
       </p:sp>
@@ -9843,10 +9822,9 @@
           <a:lstStyle/>
           <a:p>
             <a:r>
-              <a:rPr lang="en-US"/>
-              <a:t>Data Transfer - 8/13/2024</a:t>
-            </a:r>
-            <a:endParaRPr lang="en-US" dirty="0"/>
+              <a:rPr lang="en-US" dirty="0"/>
+              <a:t>Data Transfer - 1/8/2025</a:t>
+            </a:r>
           </a:p>
         </p:txBody>
       </p:sp>
@@ -9957,7 +9935,7 @@
         </p:nvSpPr>
         <p:spPr>
           <a:xfrm>
-            <a:off x="770282" y="2390169"/>
+            <a:off x="770282" y="1927031"/>
             <a:ext cx="10651435" cy="2420372"/>
           </a:xfrm>
         </p:spPr>
@@ -10022,10 +10000,9 @@
           <a:lstStyle/>
           <a:p>
             <a:r>
-              <a:rPr lang="en-US"/>
-              <a:t>Data Transfer - 8/13/2024</a:t>
-            </a:r>
-            <a:endParaRPr lang="en-US" dirty="0"/>
+              <a:rPr lang="en-US" dirty="0"/>
+              <a:t>Data Transfer - 1/8/2025</a:t>
+            </a:r>
           </a:p>
         </p:txBody>
       </p:sp>

</xml_diff>